<commit_message>
Getting ready to build the character editor...
</commit_message>
<xml_diff>
--- a/Design Notes/Game 1 - Vector Artwork.pptx
+++ b/Design Notes/Game 1 - Vector Artwork.pptx
@@ -7,6 +7,7 @@
   <p:sldIdLst>
     <p:sldId id="256" r:id="rId2"/>
     <p:sldId id="257" r:id="rId3"/>
+    <p:sldId id="258" r:id="rId4"/>
   </p:sldIdLst>
   <p:sldSz cx="12192000" cy="6858000"/>
   <p:notesSz cx="6858000" cy="9144000"/>
@@ -260,7 +261,7 @@
           <a:p>
             <a:fld id="{38C78A8B-55DF-4816-B4D6-D016811398EF}" type="datetimeFigureOut">
               <a:rPr lang="en-US" smtClean="0"/>
-              <a:t>7/30/2018</a:t>
+              <a:t>8/1/2018</a:t>
             </a:fld>
             <a:endParaRPr lang="en-US"/>
           </a:p>
@@ -458,7 +459,7 @@
           <a:p>
             <a:fld id="{38C78A8B-55DF-4816-B4D6-D016811398EF}" type="datetimeFigureOut">
               <a:rPr lang="en-US" smtClean="0"/>
-              <a:t>7/30/2018</a:t>
+              <a:t>8/1/2018</a:t>
             </a:fld>
             <a:endParaRPr lang="en-US"/>
           </a:p>
@@ -666,7 +667,7 @@
           <a:p>
             <a:fld id="{38C78A8B-55DF-4816-B4D6-D016811398EF}" type="datetimeFigureOut">
               <a:rPr lang="en-US" smtClean="0"/>
-              <a:t>7/30/2018</a:t>
+              <a:t>8/1/2018</a:t>
             </a:fld>
             <a:endParaRPr lang="en-US"/>
           </a:p>
@@ -864,7 +865,7 @@
           <a:p>
             <a:fld id="{38C78A8B-55DF-4816-B4D6-D016811398EF}" type="datetimeFigureOut">
               <a:rPr lang="en-US" smtClean="0"/>
-              <a:t>7/30/2018</a:t>
+              <a:t>8/1/2018</a:t>
             </a:fld>
             <a:endParaRPr lang="en-US"/>
           </a:p>
@@ -1139,7 +1140,7 @@
           <a:p>
             <a:fld id="{38C78A8B-55DF-4816-B4D6-D016811398EF}" type="datetimeFigureOut">
               <a:rPr lang="en-US" smtClean="0"/>
-              <a:t>7/30/2018</a:t>
+              <a:t>8/1/2018</a:t>
             </a:fld>
             <a:endParaRPr lang="en-US"/>
           </a:p>
@@ -1404,7 +1405,7 @@
           <a:p>
             <a:fld id="{38C78A8B-55DF-4816-B4D6-D016811398EF}" type="datetimeFigureOut">
               <a:rPr lang="en-US" smtClean="0"/>
-              <a:t>7/30/2018</a:t>
+              <a:t>8/1/2018</a:t>
             </a:fld>
             <a:endParaRPr lang="en-US"/>
           </a:p>
@@ -1816,7 +1817,7 @@
           <a:p>
             <a:fld id="{38C78A8B-55DF-4816-B4D6-D016811398EF}" type="datetimeFigureOut">
               <a:rPr lang="en-US" smtClean="0"/>
-              <a:t>7/30/2018</a:t>
+              <a:t>8/1/2018</a:t>
             </a:fld>
             <a:endParaRPr lang="en-US"/>
           </a:p>
@@ -1957,7 +1958,7 @@
           <a:p>
             <a:fld id="{38C78A8B-55DF-4816-B4D6-D016811398EF}" type="datetimeFigureOut">
               <a:rPr lang="en-US" smtClean="0"/>
-              <a:t>7/30/2018</a:t>
+              <a:t>8/1/2018</a:t>
             </a:fld>
             <a:endParaRPr lang="en-US"/>
           </a:p>
@@ -2070,7 +2071,7 @@
           <a:p>
             <a:fld id="{38C78A8B-55DF-4816-B4D6-D016811398EF}" type="datetimeFigureOut">
               <a:rPr lang="en-US" smtClean="0"/>
-              <a:t>7/30/2018</a:t>
+              <a:t>8/1/2018</a:t>
             </a:fld>
             <a:endParaRPr lang="en-US"/>
           </a:p>
@@ -2381,7 +2382,7 @@
           <a:p>
             <a:fld id="{38C78A8B-55DF-4816-B4D6-D016811398EF}" type="datetimeFigureOut">
               <a:rPr lang="en-US" smtClean="0"/>
-              <a:t>7/30/2018</a:t>
+              <a:t>8/1/2018</a:t>
             </a:fld>
             <a:endParaRPr lang="en-US"/>
           </a:p>
@@ -2669,7 +2670,7 @@
           <a:p>
             <a:fld id="{38C78A8B-55DF-4816-B4D6-D016811398EF}" type="datetimeFigureOut">
               <a:rPr lang="en-US" smtClean="0"/>
-              <a:t>7/30/2018</a:t>
+              <a:t>8/1/2018</a:t>
             </a:fld>
             <a:endParaRPr lang="en-US"/>
           </a:p>
@@ -2910,7 +2911,7 @@
           <a:p>
             <a:fld id="{38C78A8B-55DF-4816-B4D6-D016811398EF}" type="datetimeFigureOut">
               <a:rPr lang="en-US" smtClean="0"/>
-              <a:t>7/30/2018</a:t>
+              <a:t>8/1/2018</a:t>
             </a:fld>
             <a:endParaRPr lang="en-US"/>
           </a:p>
@@ -3540,7 +3541,7 @@
             <a:lstStyle/>
             <a:p>
               <a:pPr algn="ctr"/>
-              <a:endParaRPr lang="en-US"/>
+              <a:endParaRPr lang="en-US" dirty="0"/>
             </a:p>
           </p:txBody>
         </p:sp>
@@ -3728,7 +3729,7 @@
             <a:lstStyle/>
             <a:p>
               <a:pPr algn="ctr"/>
-              <a:endParaRPr lang="en-US"/>
+              <a:endParaRPr lang="en-US" dirty="0"/>
             </a:p>
           </p:txBody>
         </p:sp>
@@ -4069,6 +4070,1432 @@
 </p:sld>
 </file>
 
+<file path=ppt/slides/slide3.xml><?xml version="1.0" encoding="utf-8"?>
+<p:sld xmlns:a="http://schemas.openxmlformats.org/drawingml/2006/main" xmlns:r="http://schemas.openxmlformats.org/officeDocument/2006/relationships" xmlns:p="http://schemas.openxmlformats.org/presentationml/2006/main">
+  <p:cSld>
+    <p:spTree>
+      <p:nvGrpSpPr>
+        <p:cNvPr id="1" name=""/>
+        <p:cNvGrpSpPr/>
+        <p:nvPr/>
+      </p:nvGrpSpPr>
+      <p:grpSpPr>
+        <a:xfrm>
+          <a:off x="0" y="0"/>
+          <a:ext cx="0" cy="0"/>
+          <a:chOff x="0" y="0"/>
+          <a:chExt cx="0" cy="0"/>
+        </a:xfrm>
+      </p:grpSpPr>
+      <p:sp>
+        <p:nvSpPr>
+          <p:cNvPr id="4" name="Title 3">
+            <a:extLst>
+              <a:ext uri="{FF2B5EF4-FFF2-40B4-BE49-F238E27FC236}">
+                <a16:creationId xmlns:a16="http://schemas.microsoft.com/office/drawing/2014/main" id="{C733294B-1423-4C01-BAFC-CECAB6B99227}"/>
+              </a:ext>
+            </a:extLst>
+          </p:cNvPr>
+          <p:cNvSpPr>
+            <a:spLocks noGrp="1"/>
+          </p:cNvSpPr>
+          <p:nvPr>
+            <p:ph type="title"/>
+          </p:nvPr>
+        </p:nvSpPr>
+        <p:spPr/>
+        <p:txBody>
+          <a:bodyPr/>
+          <a:lstStyle/>
+          <a:p>
+            <a:r>
+              <a:rPr lang="en-US" dirty="0"/>
+              <a:t>Gear</a:t>
+            </a:r>
+          </a:p>
+        </p:txBody>
+      </p:sp>
+      <p:sp>
+        <p:nvSpPr>
+          <p:cNvPr id="25" name="Freeform: Shape 24">
+            <a:extLst>
+              <a:ext uri="{FF2B5EF4-FFF2-40B4-BE49-F238E27FC236}">
+                <a16:creationId xmlns:a16="http://schemas.microsoft.com/office/drawing/2014/main" id="{3BBC3732-C5A7-4196-8878-D1F09919EF92}"/>
+              </a:ext>
+            </a:extLst>
+          </p:cNvPr>
+          <p:cNvSpPr/>
+          <p:nvPr/>
+        </p:nvSpPr>
+        <p:spPr>
+          <a:xfrm>
+            <a:off x="1196164" y="1596081"/>
+            <a:ext cx="4974176" cy="4974176"/>
+          </a:xfrm>
+          <a:custGeom>
+            <a:avLst/>
+            <a:gdLst>
+              <a:gd name="connsiteX0" fmla="*/ 2487088 w 4974176"/>
+              <a:gd name="connsiteY0" fmla="*/ 1318246 h 4974176"/>
+              <a:gd name="connsiteX1" fmla="*/ 1318246 w 4974176"/>
+              <a:gd name="connsiteY1" fmla="*/ 2487088 h 4974176"/>
+              <a:gd name="connsiteX2" fmla="*/ 2487088 w 4974176"/>
+              <a:gd name="connsiteY2" fmla="*/ 3655930 h 4974176"/>
+              <a:gd name="connsiteX3" fmla="*/ 3655930 w 4974176"/>
+              <a:gd name="connsiteY3" fmla="*/ 2487088 h 4974176"/>
+              <a:gd name="connsiteX4" fmla="*/ 2487088 w 4974176"/>
+              <a:gd name="connsiteY4" fmla="*/ 1318246 h 4974176"/>
+              <a:gd name="connsiteX5" fmla="*/ 2404926 w 4974176"/>
+              <a:gd name="connsiteY5" fmla="*/ 0 h 4974176"/>
+              <a:gd name="connsiteX6" fmla="*/ 2569251 w 4974176"/>
+              <a:gd name="connsiteY6" fmla="*/ 0 h 4974176"/>
+              <a:gd name="connsiteX7" fmla="*/ 2681895 w 4974176"/>
+              <a:gd name="connsiteY7" fmla="*/ 112645 h 4974176"/>
+              <a:gd name="connsiteX8" fmla="*/ 2681895 w 4974176"/>
+              <a:gd name="connsiteY8" fmla="*/ 713113 h 4974176"/>
+              <a:gd name="connsiteX9" fmla="*/ 2846842 w 4974176"/>
+              <a:gd name="connsiteY9" fmla="*/ 738286 h 4974176"/>
+              <a:gd name="connsiteX10" fmla="*/ 3485137 w 4974176"/>
+              <a:gd name="connsiteY10" fmla="*/ 1006882 h 4974176"/>
+              <a:gd name="connsiteX11" fmla="*/ 3603377 w 4974176"/>
+              <a:gd name="connsiteY11" fmla="*/ 1095300 h 4974176"/>
+              <a:gd name="connsiteX12" fmla="*/ 4028324 w 4974176"/>
+              <a:gd name="connsiteY12" fmla="*/ 670354 h 4974176"/>
+              <a:gd name="connsiteX13" fmla="*/ 4187628 w 4974176"/>
+              <a:gd name="connsiteY13" fmla="*/ 670354 h 4974176"/>
+              <a:gd name="connsiteX14" fmla="*/ 4303822 w 4974176"/>
+              <a:gd name="connsiteY14" fmla="*/ 786549 h 4974176"/>
+              <a:gd name="connsiteX15" fmla="*/ 4303822 w 4974176"/>
+              <a:gd name="connsiteY15" fmla="*/ 945853 h 4974176"/>
+              <a:gd name="connsiteX16" fmla="*/ 3878876 w 4974176"/>
+              <a:gd name="connsiteY16" fmla="*/ 1370799 h 4974176"/>
+              <a:gd name="connsiteX17" fmla="*/ 3967295 w 4974176"/>
+              <a:gd name="connsiteY17" fmla="*/ 1489040 h 4974176"/>
+              <a:gd name="connsiteX18" fmla="*/ 4235890 w 4974176"/>
+              <a:gd name="connsiteY18" fmla="*/ 2127335 h 4974176"/>
+              <a:gd name="connsiteX19" fmla="*/ 4261064 w 4974176"/>
+              <a:gd name="connsiteY19" fmla="*/ 2292281 h 4974176"/>
+              <a:gd name="connsiteX20" fmla="*/ 4861531 w 4974176"/>
+              <a:gd name="connsiteY20" fmla="*/ 2292281 h 4974176"/>
+              <a:gd name="connsiteX21" fmla="*/ 4974176 w 4974176"/>
+              <a:gd name="connsiteY21" fmla="*/ 2404926 h 4974176"/>
+              <a:gd name="connsiteX22" fmla="*/ 4974176 w 4974176"/>
+              <a:gd name="connsiteY22" fmla="*/ 2569250 h 4974176"/>
+              <a:gd name="connsiteX23" fmla="*/ 4861531 w 4974176"/>
+              <a:gd name="connsiteY23" fmla="*/ 2681895 h 4974176"/>
+              <a:gd name="connsiteX24" fmla="*/ 4261064 w 4974176"/>
+              <a:gd name="connsiteY24" fmla="*/ 2681895 h 4974176"/>
+              <a:gd name="connsiteX25" fmla="*/ 4235890 w 4974176"/>
+              <a:gd name="connsiteY25" fmla="*/ 2846842 h 4974176"/>
+              <a:gd name="connsiteX26" fmla="*/ 3967295 w 4974176"/>
+              <a:gd name="connsiteY26" fmla="*/ 3485137 h 4974176"/>
+              <a:gd name="connsiteX27" fmla="*/ 3878876 w 4974176"/>
+              <a:gd name="connsiteY27" fmla="*/ 3603377 h 4974176"/>
+              <a:gd name="connsiteX28" fmla="*/ 4303822 w 4974176"/>
+              <a:gd name="connsiteY28" fmla="*/ 4028324 h 4974176"/>
+              <a:gd name="connsiteX29" fmla="*/ 4303822 w 4974176"/>
+              <a:gd name="connsiteY29" fmla="*/ 4187628 h 4974176"/>
+              <a:gd name="connsiteX30" fmla="*/ 4187628 w 4974176"/>
+              <a:gd name="connsiteY30" fmla="*/ 4303822 h 4974176"/>
+              <a:gd name="connsiteX31" fmla="*/ 4028324 w 4974176"/>
+              <a:gd name="connsiteY31" fmla="*/ 4303822 h 4974176"/>
+              <a:gd name="connsiteX32" fmla="*/ 3603377 w 4974176"/>
+              <a:gd name="connsiteY32" fmla="*/ 3878876 h 4974176"/>
+              <a:gd name="connsiteX33" fmla="*/ 3485137 w 4974176"/>
+              <a:gd name="connsiteY33" fmla="*/ 3967295 h 4974176"/>
+              <a:gd name="connsiteX34" fmla="*/ 2846842 w 4974176"/>
+              <a:gd name="connsiteY34" fmla="*/ 4235890 h 4974176"/>
+              <a:gd name="connsiteX35" fmla="*/ 2681895 w 4974176"/>
+              <a:gd name="connsiteY35" fmla="*/ 4261064 h 4974176"/>
+              <a:gd name="connsiteX36" fmla="*/ 2681895 w 4974176"/>
+              <a:gd name="connsiteY36" fmla="*/ 4861531 h 4974176"/>
+              <a:gd name="connsiteX37" fmla="*/ 2569251 w 4974176"/>
+              <a:gd name="connsiteY37" fmla="*/ 4974176 h 4974176"/>
+              <a:gd name="connsiteX38" fmla="*/ 2404926 w 4974176"/>
+              <a:gd name="connsiteY38" fmla="*/ 4974176 h 4974176"/>
+              <a:gd name="connsiteX39" fmla="*/ 2292281 w 4974176"/>
+              <a:gd name="connsiteY39" fmla="*/ 4861531 h 4974176"/>
+              <a:gd name="connsiteX40" fmla="*/ 2292281 w 4974176"/>
+              <a:gd name="connsiteY40" fmla="*/ 4261064 h 4974176"/>
+              <a:gd name="connsiteX41" fmla="*/ 2127335 w 4974176"/>
+              <a:gd name="connsiteY41" fmla="*/ 4235890 h 4974176"/>
+              <a:gd name="connsiteX42" fmla="*/ 1489040 w 4974176"/>
+              <a:gd name="connsiteY42" fmla="*/ 3967295 h 4974176"/>
+              <a:gd name="connsiteX43" fmla="*/ 1370799 w 4974176"/>
+              <a:gd name="connsiteY43" fmla="*/ 3878876 h 4974176"/>
+              <a:gd name="connsiteX44" fmla="*/ 945853 w 4974176"/>
+              <a:gd name="connsiteY44" fmla="*/ 4303822 h 4974176"/>
+              <a:gd name="connsiteX45" fmla="*/ 786549 w 4974176"/>
+              <a:gd name="connsiteY45" fmla="*/ 4303822 h 4974176"/>
+              <a:gd name="connsiteX46" fmla="*/ 670354 w 4974176"/>
+              <a:gd name="connsiteY46" fmla="*/ 4187628 h 4974176"/>
+              <a:gd name="connsiteX47" fmla="*/ 670354 w 4974176"/>
+              <a:gd name="connsiteY47" fmla="*/ 4028324 h 4974176"/>
+              <a:gd name="connsiteX48" fmla="*/ 1095301 w 4974176"/>
+              <a:gd name="connsiteY48" fmla="*/ 3603377 h 4974176"/>
+              <a:gd name="connsiteX49" fmla="*/ 1006882 w 4974176"/>
+              <a:gd name="connsiteY49" fmla="*/ 3485137 h 4974176"/>
+              <a:gd name="connsiteX50" fmla="*/ 738287 w 4974176"/>
+              <a:gd name="connsiteY50" fmla="*/ 2846842 h 4974176"/>
+              <a:gd name="connsiteX51" fmla="*/ 713113 w 4974176"/>
+              <a:gd name="connsiteY51" fmla="*/ 2681895 h 4974176"/>
+              <a:gd name="connsiteX52" fmla="*/ 112645 w 4974176"/>
+              <a:gd name="connsiteY52" fmla="*/ 2681895 h 4974176"/>
+              <a:gd name="connsiteX53" fmla="*/ 0 w 4974176"/>
+              <a:gd name="connsiteY53" fmla="*/ 2569250 h 4974176"/>
+              <a:gd name="connsiteX54" fmla="*/ 0 w 4974176"/>
+              <a:gd name="connsiteY54" fmla="*/ 2404926 h 4974176"/>
+              <a:gd name="connsiteX55" fmla="*/ 112645 w 4974176"/>
+              <a:gd name="connsiteY55" fmla="*/ 2292281 h 4974176"/>
+              <a:gd name="connsiteX56" fmla="*/ 713113 w 4974176"/>
+              <a:gd name="connsiteY56" fmla="*/ 2292281 h 4974176"/>
+              <a:gd name="connsiteX57" fmla="*/ 738287 w 4974176"/>
+              <a:gd name="connsiteY57" fmla="*/ 2127335 h 4974176"/>
+              <a:gd name="connsiteX58" fmla="*/ 1006882 w 4974176"/>
+              <a:gd name="connsiteY58" fmla="*/ 1489040 h 4974176"/>
+              <a:gd name="connsiteX59" fmla="*/ 1095301 w 4974176"/>
+              <a:gd name="connsiteY59" fmla="*/ 1370799 h 4974176"/>
+              <a:gd name="connsiteX60" fmla="*/ 670354 w 4974176"/>
+              <a:gd name="connsiteY60" fmla="*/ 945853 h 4974176"/>
+              <a:gd name="connsiteX61" fmla="*/ 670354 w 4974176"/>
+              <a:gd name="connsiteY61" fmla="*/ 786549 h 4974176"/>
+              <a:gd name="connsiteX62" fmla="*/ 786549 w 4974176"/>
+              <a:gd name="connsiteY62" fmla="*/ 670354 h 4974176"/>
+              <a:gd name="connsiteX63" fmla="*/ 866201 w 4974176"/>
+              <a:gd name="connsiteY63" fmla="*/ 637361 h 4974176"/>
+              <a:gd name="connsiteX64" fmla="*/ 945853 w 4974176"/>
+              <a:gd name="connsiteY64" fmla="*/ 670354 h 4974176"/>
+              <a:gd name="connsiteX65" fmla="*/ 1370799 w 4974176"/>
+              <a:gd name="connsiteY65" fmla="*/ 1095300 h 4974176"/>
+              <a:gd name="connsiteX66" fmla="*/ 1489040 w 4974176"/>
+              <a:gd name="connsiteY66" fmla="*/ 1006882 h 4974176"/>
+              <a:gd name="connsiteX67" fmla="*/ 2127335 w 4974176"/>
+              <a:gd name="connsiteY67" fmla="*/ 738286 h 4974176"/>
+              <a:gd name="connsiteX68" fmla="*/ 2292281 w 4974176"/>
+              <a:gd name="connsiteY68" fmla="*/ 713113 h 4974176"/>
+              <a:gd name="connsiteX69" fmla="*/ 2292281 w 4974176"/>
+              <a:gd name="connsiteY69" fmla="*/ 112645 h 4974176"/>
+              <a:gd name="connsiteX70" fmla="*/ 2404926 w 4974176"/>
+              <a:gd name="connsiteY70" fmla="*/ 0 h 4974176"/>
+            </a:gdLst>
+            <a:ahLst/>
+            <a:cxnLst>
+              <a:cxn ang="0">
+                <a:pos x="connsiteX0" y="connsiteY0"/>
+              </a:cxn>
+              <a:cxn ang="0">
+                <a:pos x="connsiteX1" y="connsiteY1"/>
+              </a:cxn>
+              <a:cxn ang="0">
+                <a:pos x="connsiteX2" y="connsiteY2"/>
+              </a:cxn>
+              <a:cxn ang="0">
+                <a:pos x="connsiteX3" y="connsiteY3"/>
+              </a:cxn>
+              <a:cxn ang="0">
+                <a:pos x="connsiteX4" y="connsiteY4"/>
+              </a:cxn>
+              <a:cxn ang="0">
+                <a:pos x="connsiteX5" y="connsiteY5"/>
+              </a:cxn>
+              <a:cxn ang="0">
+                <a:pos x="connsiteX6" y="connsiteY6"/>
+              </a:cxn>
+              <a:cxn ang="0">
+                <a:pos x="connsiteX7" y="connsiteY7"/>
+              </a:cxn>
+              <a:cxn ang="0">
+                <a:pos x="connsiteX8" y="connsiteY8"/>
+              </a:cxn>
+              <a:cxn ang="0">
+                <a:pos x="connsiteX9" y="connsiteY9"/>
+              </a:cxn>
+              <a:cxn ang="0">
+                <a:pos x="connsiteX10" y="connsiteY10"/>
+              </a:cxn>
+              <a:cxn ang="0">
+                <a:pos x="connsiteX11" y="connsiteY11"/>
+              </a:cxn>
+              <a:cxn ang="0">
+                <a:pos x="connsiteX12" y="connsiteY12"/>
+              </a:cxn>
+              <a:cxn ang="0">
+                <a:pos x="connsiteX13" y="connsiteY13"/>
+              </a:cxn>
+              <a:cxn ang="0">
+                <a:pos x="connsiteX14" y="connsiteY14"/>
+              </a:cxn>
+              <a:cxn ang="0">
+                <a:pos x="connsiteX15" y="connsiteY15"/>
+              </a:cxn>
+              <a:cxn ang="0">
+                <a:pos x="connsiteX16" y="connsiteY16"/>
+              </a:cxn>
+              <a:cxn ang="0">
+                <a:pos x="connsiteX17" y="connsiteY17"/>
+              </a:cxn>
+              <a:cxn ang="0">
+                <a:pos x="connsiteX18" y="connsiteY18"/>
+              </a:cxn>
+              <a:cxn ang="0">
+                <a:pos x="connsiteX19" y="connsiteY19"/>
+              </a:cxn>
+              <a:cxn ang="0">
+                <a:pos x="connsiteX20" y="connsiteY20"/>
+              </a:cxn>
+              <a:cxn ang="0">
+                <a:pos x="connsiteX21" y="connsiteY21"/>
+              </a:cxn>
+              <a:cxn ang="0">
+                <a:pos x="connsiteX22" y="connsiteY22"/>
+              </a:cxn>
+              <a:cxn ang="0">
+                <a:pos x="connsiteX23" y="connsiteY23"/>
+              </a:cxn>
+              <a:cxn ang="0">
+                <a:pos x="connsiteX24" y="connsiteY24"/>
+              </a:cxn>
+              <a:cxn ang="0">
+                <a:pos x="connsiteX25" y="connsiteY25"/>
+              </a:cxn>
+              <a:cxn ang="0">
+                <a:pos x="connsiteX26" y="connsiteY26"/>
+              </a:cxn>
+              <a:cxn ang="0">
+                <a:pos x="connsiteX27" y="connsiteY27"/>
+              </a:cxn>
+              <a:cxn ang="0">
+                <a:pos x="connsiteX28" y="connsiteY28"/>
+              </a:cxn>
+              <a:cxn ang="0">
+                <a:pos x="connsiteX29" y="connsiteY29"/>
+              </a:cxn>
+              <a:cxn ang="0">
+                <a:pos x="connsiteX30" y="connsiteY30"/>
+              </a:cxn>
+              <a:cxn ang="0">
+                <a:pos x="connsiteX31" y="connsiteY31"/>
+              </a:cxn>
+              <a:cxn ang="0">
+                <a:pos x="connsiteX32" y="connsiteY32"/>
+              </a:cxn>
+              <a:cxn ang="0">
+                <a:pos x="connsiteX33" y="connsiteY33"/>
+              </a:cxn>
+              <a:cxn ang="0">
+                <a:pos x="connsiteX34" y="connsiteY34"/>
+              </a:cxn>
+              <a:cxn ang="0">
+                <a:pos x="connsiteX35" y="connsiteY35"/>
+              </a:cxn>
+              <a:cxn ang="0">
+                <a:pos x="connsiteX36" y="connsiteY36"/>
+              </a:cxn>
+              <a:cxn ang="0">
+                <a:pos x="connsiteX37" y="connsiteY37"/>
+              </a:cxn>
+              <a:cxn ang="0">
+                <a:pos x="connsiteX38" y="connsiteY38"/>
+              </a:cxn>
+              <a:cxn ang="0">
+                <a:pos x="connsiteX39" y="connsiteY39"/>
+              </a:cxn>
+              <a:cxn ang="0">
+                <a:pos x="connsiteX40" y="connsiteY40"/>
+              </a:cxn>
+              <a:cxn ang="0">
+                <a:pos x="connsiteX41" y="connsiteY41"/>
+              </a:cxn>
+              <a:cxn ang="0">
+                <a:pos x="connsiteX42" y="connsiteY42"/>
+              </a:cxn>
+              <a:cxn ang="0">
+                <a:pos x="connsiteX43" y="connsiteY43"/>
+              </a:cxn>
+              <a:cxn ang="0">
+                <a:pos x="connsiteX44" y="connsiteY44"/>
+              </a:cxn>
+              <a:cxn ang="0">
+                <a:pos x="connsiteX45" y="connsiteY45"/>
+              </a:cxn>
+              <a:cxn ang="0">
+                <a:pos x="connsiteX46" y="connsiteY46"/>
+              </a:cxn>
+              <a:cxn ang="0">
+                <a:pos x="connsiteX47" y="connsiteY47"/>
+              </a:cxn>
+              <a:cxn ang="0">
+                <a:pos x="connsiteX48" y="connsiteY48"/>
+              </a:cxn>
+              <a:cxn ang="0">
+                <a:pos x="connsiteX49" y="connsiteY49"/>
+              </a:cxn>
+              <a:cxn ang="0">
+                <a:pos x="connsiteX50" y="connsiteY50"/>
+              </a:cxn>
+              <a:cxn ang="0">
+                <a:pos x="connsiteX51" y="connsiteY51"/>
+              </a:cxn>
+              <a:cxn ang="0">
+                <a:pos x="connsiteX52" y="connsiteY52"/>
+              </a:cxn>
+              <a:cxn ang="0">
+                <a:pos x="connsiteX53" y="connsiteY53"/>
+              </a:cxn>
+              <a:cxn ang="0">
+                <a:pos x="connsiteX54" y="connsiteY54"/>
+              </a:cxn>
+              <a:cxn ang="0">
+                <a:pos x="connsiteX55" y="connsiteY55"/>
+              </a:cxn>
+              <a:cxn ang="0">
+                <a:pos x="connsiteX56" y="connsiteY56"/>
+              </a:cxn>
+              <a:cxn ang="0">
+                <a:pos x="connsiteX57" y="connsiteY57"/>
+              </a:cxn>
+              <a:cxn ang="0">
+                <a:pos x="connsiteX58" y="connsiteY58"/>
+              </a:cxn>
+              <a:cxn ang="0">
+                <a:pos x="connsiteX59" y="connsiteY59"/>
+              </a:cxn>
+              <a:cxn ang="0">
+                <a:pos x="connsiteX60" y="connsiteY60"/>
+              </a:cxn>
+              <a:cxn ang="0">
+                <a:pos x="connsiteX61" y="connsiteY61"/>
+              </a:cxn>
+              <a:cxn ang="0">
+                <a:pos x="connsiteX62" y="connsiteY62"/>
+              </a:cxn>
+              <a:cxn ang="0">
+                <a:pos x="connsiteX63" y="connsiteY63"/>
+              </a:cxn>
+              <a:cxn ang="0">
+                <a:pos x="connsiteX64" y="connsiteY64"/>
+              </a:cxn>
+              <a:cxn ang="0">
+                <a:pos x="connsiteX65" y="connsiteY65"/>
+              </a:cxn>
+              <a:cxn ang="0">
+                <a:pos x="connsiteX66" y="connsiteY66"/>
+              </a:cxn>
+              <a:cxn ang="0">
+                <a:pos x="connsiteX67" y="connsiteY67"/>
+              </a:cxn>
+              <a:cxn ang="0">
+                <a:pos x="connsiteX68" y="connsiteY68"/>
+              </a:cxn>
+              <a:cxn ang="0">
+                <a:pos x="connsiteX69" y="connsiteY69"/>
+              </a:cxn>
+              <a:cxn ang="0">
+                <a:pos x="connsiteX70" y="connsiteY70"/>
+              </a:cxn>
+            </a:cxnLst>
+            <a:rect l="l" t="t" r="r" b="b"/>
+            <a:pathLst>
+              <a:path w="4974176" h="4974176">
+                <a:moveTo>
+                  <a:pt x="2487088" y="1318246"/>
+                </a:moveTo>
+                <a:cubicBezTo>
+                  <a:pt x="1841554" y="1318246"/>
+                  <a:pt x="1318246" y="1841554"/>
+                  <a:pt x="1318246" y="2487088"/>
+                </a:cubicBezTo>
+                <a:cubicBezTo>
+                  <a:pt x="1318246" y="3132622"/>
+                  <a:pt x="1841554" y="3655930"/>
+                  <a:pt x="2487088" y="3655930"/>
+                </a:cubicBezTo>
+                <a:cubicBezTo>
+                  <a:pt x="3132622" y="3655930"/>
+                  <a:pt x="3655930" y="3132622"/>
+                  <a:pt x="3655930" y="2487088"/>
+                </a:cubicBezTo>
+                <a:cubicBezTo>
+                  <a:pt x="3655930" y="1841554"/>
+                  <a:pt x="3132622" y="1318246"/>
+                  <a:pt x="2487088" y="1318246"/>
+                </a:cubicBezTo>
+                <a:close/>
+                <a:moveTo>
+                  <a:pt x="2404926" y="0"/>
+                </a:moveTo>
+                <a:lnTo>
+                  <a:pt x="2569251" y="0"/>
+                </a:lnTo>
+                <a:cubicBezTo>
+                  <a:pt x="2631462" y="0"/>
+                  <a:pt x="2681895" y="50433"/>
+                  <a:pt x="2681895" y="112645"/>
+                </a:cubicBezTo>
+                <a:lnTo>
+                  <a:pt x="2681895" y="713113"/>
+                </a:lnTo>
+                <a:lnTo>
+                  <a:pt x="2846842" y="738286"/>
+                </a:lnTo>
+                <a:cubicBezTo>
+                  <a:pt x="3079249" y="785844"/>
+                  <a:pt x="3295204" y="878566"/>
+                  <a:pt x="3485137" y="1006882"/>
+                </a:cubicBezTo>
+                <a:lnTo>
+                  <a:pt x="3603377" y="1095300"/>
+                </a:lnTo>
+                <a:lnTo>
+                  <a:pt x="4028324" y="670354"/>
+                </a:lnTo>
+                <a:cubicBezTo>
+                  <a:pt x="4072314" y="626363"/>
+                  <a:pt x="4143637" y="626363"/>
+                  <a:pt x="4187628" y="670354"/>
+                </a:cubicBezTo>
+                <a:lnTo>
+                  <a:pt x="4303822" y="786549"/>
+                </a:lnTo>
+                <a:cubicBezTo>
+                  <a:pt x="4347813" y="830539"/>
+                  <a:pt x="4347813" y="901862"/>
+                  <a:pt x="4303822" y="945853"/>
+                </a:cubicBezTo>
+                <a:lnTo>
+                  <a:pt x="3878876" y="1370799"/>
+                </a:lnTo>
+                <a:lnTo>
+                  <a:pt x="3967295" y="1489040"/>
+                </a:lnTo>
+                <a:cubicBezTo>
+                  <a:pt x="4095611" y="1678972"/>
+                  <a:pt x="4188333" y="1894927"/>
+                  <a:pt x="4235890" y="2127335"/>
+                </a:cubicBezTo>
+                <a:lnTo>
+                  <a:pt x="4261064" y="2292281"/>
+                </a:lnTo>
+                <a:lnTo>
+                  <a:pt x="4861531" y="2292281"/>
+                </a:lnTo>
+                <a:cubicBezTo>
+                  <a:pt x="4923743" y="2292281"/>
+                  <a:pt x="4974176" y="2342714"/>
+                  <a:pt x="4974176" y="2404926"/>
+                </a:cubicBezTo>
+                <a:lnTo>
+                  <a:pt x="4974176" y="2569250"/>
+                </a:lnTo>
+                <a:cubicBezTo>
+                  <a:pt x="4974176" y="2631462"/>
+                  <a:pt x="4923743" y="2681895"/>
+                  <a:pt x="4861531" y="2681895"/>
+                </a:cubicBezTo>
+                <a:lnTo>
+                  <a:pt x="4261064" y="2681895"/>
+                </a:lnTo>
+                <a:lnTo>
+                  <a:pt x="4235890" y="2846842"/>
+                </a:lnTo>
+                <a:cubicBezTo>
+                  <a:pt x="4188333" y="3079249"/>
+                  <a:pt x="4095611" y="3295204"/>
+                  <a:pt x="3967295" y="3485137"/>
+                </a:cubicBezTo>
+                <a:lnTo>
+                  <a:pt x="3878876" y="3603377"/>
+                </a:lnTo>
+                <a:lnTo>
+                  <a:pt x="4303822" y="4028324"/>
+                </a:lnTo>
+                <a:cubicBezTo>
+                  <a:pt x="4347813" y="4072314"/>
+                  <a:pt x="4347813" y="4143637"/>
+                  <a:pt x="4303822" y="4187628"/>
+                </a:cubicBezTo>
+                <a:lnTo>
+                  <a:pt x="4187628" y="4303822"/>
+                </a:lnTo>
+                <a:cubicBezTo>
+                  <a:pt x="4143637" y="4347813"/>
+                  <a:pt x="4072314" y="4347813"/>
+                  <a:pt x="4028324" y="4303822"/>
+                </a:cubicBezTo>
+                <a:lnTo>
+                  <a:pt x="3603377" y="3878876"/>
+                </a:lnTo>
+                <a:lnTo>
+                  <a:pt x="3485137" y="3967295"/>
+                </a:lnTo>
+                <a:cubicBezTo>
+                  <a:pt x="3295204" y="4095611"/>
+                  <a:pt x="3079249" y="4188333"/>
+                  <a:pt x="2846842" y="4235890"/>
+                </a:cubicBezTo>
+                <a:lnTo>
+                  <a:pt x="2681895" y="4261064"/>
+                </a:lnTo>
+                <a:lnTo>
+                  <a:pt x="2681895" y="4861531"/>
+                </a:lnTo>
+                <a:cubicBezTo>
+                  <a:pt x="2681895" y="4923744"/>
+                  <a:pt x="2631462" y="4974177"/>
+                  <a:pt x="2569251" y="4974176"/>
+                </a:cubicBezTo>
+                <a:lnTo>
+                  <a:pt x="2404926" y="4974176"/>
+                </a:lnTo>
+                <a:cubicBezTo>
+                  <a:pt x="2342714" y="4974177"/>
+                  <a:pt x="2292281" y="4923744"/>
+                  <a:pt x="2292281" y="4861531"/>
+                </a:cubicBezTo>
+                <a:lnTo>
+                  <a:pt x="2292281" y="4261064"/>
+                </a:lnTo>
+                <a:lnTo>
+                  <a:pt x="2127335" y="4235890"/>
+                </a:lnTo>
+                <a:cubicBezTo>
+                  <a:pt x="1894928" y="4188333"/>
+                  <a:pt x="1678972" y="4095611"/>
+                  <a:pt x="1489040" y="3967295"/>
+                </a:cubicBezTo>
+                <a:lnTo>
+                  <a:pt x="1370799" y="3878876"/>
+                </a:lnTo>
+                <a:lnTo>
+                  <a:pt x="945853" y="4303822"/>
+                </a:lnTo>
+                <a:cubicBezTo>
+                  <a:pt x="901862" y="4347813"/>
+                  <a:pt x="830539" y="4347813"/>
+                  <a:pt x="786549" y="4303822"/>
+                </a:cubicBezTo>
+                <a:lnTo>
+                  <a:pt x="670354" y="4187628"/>
+                </a:lnTo>
+                <a:cubicBezTo>
+                  <a:pt x="626363" y="4143637"/>
+                  <a:pt x="626363" y="4072314"/>
+                  <a:pt x="670354" y="4028324"/>
+                </a:cubicBezTo>
+                <a:lnTo>
+                  <a:pt x="1095301" y="3603377"/>
+                </a:lnTo>
+                <a:lnTo>
+                  <a:pt x="1006882" y="3485137"/>
+                </a:lnTo>
+                <a:cubicBezTo>
+                  <a:pt x="878566" y="3295204"/>
+                  <a:pt x="785844" y="3079249"/>
+                  <a:pt x="738287" y="2846842"/>
+                </a:cubicBezTo>
+                <a:lnTo>
+                  <a:pt x="713113" y="2681895"/>
+                </a:lnTo>
+                <a:lnTo>
+                  <a:pt x="112645" y="2681895"/>
+                </a:lnTo>
+                <a:cubicBezTo>
+                  <a:pt x="50433" y="2681895"/>
+                  <a:pt x="0" y="2631462"/>
+                  <a:pt x="0" y="2569250"/>
+                </a:cubicBezTo>
+                <a:lnTo>
+                  <a:pt x="0" y="2404926"/>
+                </a:lnTo>
+                <a:cubicBezTo>
+                  <a:pt x="0" y="2342714"/>
+                  <a:pt x="50433" y="2292281"/>
+                  <a:pt x="112645" y="2292281"/>
+                </a:cubicBezTo>
+                <a:lnTo>
+                  <a:pt x="713113" y="2292281"/>
+                </a:lnTo>
+                <a:lnTo>
+                  <a:pt x="738287" y="2127335"/>
+                </a:lnTo>
+                <a:cubicBezTo>
+                  <a:pt x="785844" y="1894927"/>
+                  <a:pt x="878566" y="1678972"/>
+                  <a:pt x="1006882" y="1489040"/>
+                </a:cubicBezTo>
+                <a:lnTo>
+                  <a:pt x="1095301" y="1370799"/>
+                </a:lnTo>
+                <a:lnTo>
+                  <a:pt x="670354" y="945853"/>
+                </a:lnTo>
+                <a:cubicBezTo>
+                  <a:pt x="626363" y="901862"/>
+                  <a:pt x="626363" y="830539"/>
+                  <a:pt x="670354" y="786549"/>
+                </a:cubicBezTo>
+                <a:lnTo>
+                  <a:pt x="786549" y="670354"/>
+                </a:lnTo>
+                <a:cubicBezTo>
+                  <a:pt x="808544" y="648359"/>
+                  <a:pt x="837372" y="637361"/>
+                  <a:pt x="866201" y="637361"/>
+                </a:cubicBezTo>
+                <a:cubicBezTo>
+                  <a:pt x="895030" y="637361"/>
+                  <a:pt x="923858" y="648359"/>
+                  <a:pt x="945853" y="670354"/>
+                </a:cubicBezTo>
+                <a:lnTo>
+                  <a:pt x="1370799" y="1095300"/>
+                </a:lnTo>
+                <a:lnTo>
+                  <a:pt x="1489040" y="1006882"/>
+                </a:lnTo>
+                <a:cubicBezTo>
+                  <a:pt x="1678972" y="878566"/>
+                  <a:pt x="1894928" y="785844"/>
+                  <a:pt x="2127335" y="738286"/>
+                </a:cubicBezTo>
+                <a:lnTo>
+                  <a:pt x="2292281" y="713113"/>
+                </a:lnTo>
+                <a:lnTo>
+                  <a:pt x="2292281" y="112645"/>
+                </a:lnTo>
+                <a:cubicBezTo>
+                  <a:pt x="2292281" y="50433"/>
+                  <a:pt x="2342715" y="0"/>
+                  <a:pt x="2404926" y="0"/>
+                </a:cubicBezTo>
+                <a:close/>
+              </a:path>
+            </a:pathLst>
+          </a:custGeom>
+        </p:spPr>
+        <p:style>
+          <a:lnRef idx="2">
+            <a:schemeClr val="accent1">
+              <a:shade val="50000"/>
+            </a:schemeClr>
+          </a:lnRef>
+          <a:fillRef idx="1">
+            <a:schemeClr val="accent1"/>
+          </a:fillRef>
+          <a:effectRef idx="0">
+            <a:schemeClr val="accent1"/>
+          </a:effectRef>
+          <a:fontRef idx="minor">
+            <a:schemeClr val="lt1"/>
+          </a:fontRef>
+        </p:style>
+        <p:txBody>
+          <a:bodyPr rtlCol="0" anchor="ctr"/>
+          <a:lstStyle/>
+          <a:p>
+            <a:pPr algn="ctr"/>
+            <a:endParaRPr lang="en-US"/>
+          </a:p>
+        </p:txBody>
+      </p:sp>
+      <p:sp>
+        <p:nvSpPr>
+          <p:cNvPr id="44" name="Freeform: Shape 43">
+            <a:extLst>
+              <a:ext uri="{FF2B5EF4-FFF2-40B4-BE49-F238E27FC236}">
+                <a16:creationId xmlns:a16="http://schemas.microsoft.com/office/drawing/2014/main" id="{5F44E1CF-C8DB-48ED-A010-57B6F7A100E7}"/>
+              </a:ext>
+            </a:extLst>
+          </p:cNvPr>
+          <p:cNvSpPr/>
+          <p:nvPr/>
+        </p:nvSpPr>
+        <p:spPr>
+          <a:xfrm rot="20627215">
+            <a:off x="5434694" y="827460"/>
+            <a:ext cx="3861797" cy="3861797"/>
+          </a:xfrm>
+          <a:custGeom>
+            <a:avLst/>
+            <a:gdLst>
+              <a:gd name="connsiteX0" fmla="*/ 2449996 w 4899993"/>
+              <a:gd name="connsiteY0" fmla="*/ 1523690 h 4899993"/>
+              <a:gd name="connsiteX1" fmla="*/ 1523690 w 4899993"/>
+              <a:gd name="connsiteY1" fmla="*/ 2449996 h 4899993"/>
+              <a:gd name="connsiteX2" fmla="*/ 2449996 w 4899993"/>
+              <a:gd name="connsiteY2" fmla="*/ 3376302 h 4899993"/>
+              <a:gd name="connsiteX3" fmla="*/ 3376302 w 4899993"/>
+              <a:gd name="connsiteY3" fmla="*/ 2449996 h 4899993"/>
+              <a:gd name="connsiteX4" fmla="*/ 2449996 w 4899993"/>
+              <a:gd name="connsiteY4" fmla="*/ 1523690 h 4899993"/>
+              <a:gd name="connsiteX5" fmla="*/ 2227361 w 4899993"/>
+              <a:gd name="connsiteY5" fmla="*/ 0 h 4899993"/>
+              <a:gd name="connsiteX6" fmla="*/ 2672633 w 4899993"/>
+              <a:gd name="connsiteY6" fmla="*/ 0 h 4899993"/>
+              <a:gd name="connsiteX7" fmla="*/ 2855513 w 4899993"/>
+              <a:gd name="connsiteY7" fmla="*/ 182880 h 4899993"/>
+              <a:gd name="connsiteX8" fmla="*/ 2855513 w 4899993"/>
+              <a:gd name="connsiteY8" fmla="*/ 621534 h 4899993"/>
+              <a:gd name="connsiteX9" fmla="*/ 3007180 w 4899993"/>
+              <a:gd name="connsiteY9" fmla="*/ 660531 h 4899993"/>
+              <a:gd name="connsiteX10" fmla="*/ 3343117 w 4899993"/>
+              <a:gd name="connsiteY10" fmla="*/ 802439 h 4899993"/>
+              <a:gd name="connsiteX11" fmla="*/ 3455682 w 4899993"/>
+              <a:gd name="connsiteY11" fmla="*/ 870825 h 4899993"/>
+              <a:gd name="connsiteX12" fmla="*/ 3766347 w 4899993"/>
+              <a:gd name="connsiteY12" fmla="*/ 560160 h 4899993"/>
+              <a:gd name="connsiteX13" fmla="*/ 4024978 w 4899993"/>
+              <a:gd name="connsiteY13" fmla="*/ 560161 h 4899993"/>
+              <a:gd name="connsiteX14" fmla="*/ 4339834 w 4899993"/>
+              <a:gd name="connsiteY14" fmla="*/ 875015 h 4899993"/>
+              <a:gd name="connsiteX15" fmla="*/ 4339834 w 4899993"/>
+              <a:gd name="connsiteY15" fmla="*/ 1133647 h 4899993"/>
+              <a:gd name="connsiteX16" fmla="*/ 4029170 w 4899993"/>
+              <a:gd name="connsiteY16" fmla="*/ 1444311 h 4899993"/>
+              <a:gd name="connsiteX17" fmla="*/ 4097556 w 4899993"/>
+              <a:gd name="connsiteY17" fmla="*/ 1556879 h 4899993"/>
+              <a:gd name="connsiteX18" fmla="*/ 4239464 w 4899993"/>
+              <a:gd name="connsiteY18" fmla="*/ 1892815 h 4899993"/>
+              <a:gd name="connsiteX19" fmla="*/ 4278461 w 4899993"/>
+              <a:gd name="connsiteY19" fmla="*/ 2044480 h 4899993"/>
+              <a:gd name="connsiteX20" fmla="*/ 4717113 w 4899993"/>
+              <a:gd name="connsiteY20" fmla="*/ 2044480 h 4899993"/>
+              <a:gd name="connsiteX21" fmla="*/ 4899993 w 4899993"/>
+              <a:gd name="connsiteY21" fmla="*/ 2227360 h 4899993"/>
+              <a:gd name="connsiteX22" fmla="*/ 4899993 w 4899993"/>
+              <a:gd name="connsiteY22" fmla="*/ 2672633 h 4899993"/>
+              <a:gd name="connsiteX23" fmla="*/ 4717113 w 4899993"/>
+              <a:gd name="connsiteY23" fmla="*/ 2855513 h 4899993"/>
+              <a:gd name="connsiteX24" fmla="*/ 4278461 w 4899993"/>
+              <a:gd name="connsiteY24" fmla="*/ 2855513 h 4899993"/>
+              <a:gd name="connsiteX25" fmla="*/ 4239464 w 4899993"/>
+              <a:gd name="connsiteY25" fmla="*/ 3007179 h 4899993"/>
+              <a:gd name="connsiteX26" fmla="*/ 4097556 w 4899993"/>
+              <a:gd name="connsiteY26" fmla="*/ 3343116 h 4899993"/>
+              <a:gd name="connsiteX27" fmla="*/ 4029170 w 4899993"/>
+              <a:gd name="connsiteY27" fmla="*/ 3455683 h 4899993"/>
+              <a:gd name="connsiteX28" fmla="*/ 4339833 w 4899993"/>
+              <a:gd name="connsiteY28" fmla="*/ 3766346 h 4899993"/>
+              <a:gd name="connsiteX29" fmla="*/ 4339833 w 4899993"/>
+              <a:gd name="connsiteY29" fmla="*/ 4024978 h 4899993"/>
+              <a:gd name="connsiteX30" fmla="*/ 4024978 w 4899993"/>
+              <a:gd name="connsiteY30" fmla="*/ 4339833 h 4899993"/>
+              <a:gd name="connsiteX31" fmla="*/ 3766346 w 4899993"/>
+              <a:gd name="connsiteY31" fmla="*/ 4339833 h 4899993"/>
+              <a:gd name="connsiteX32" fmla="*/ 3455683 w 4899993"/>
+              <a:gd name="connsiteY32" fmla="*/ 4029170 h 4899993"/>
+              <a:gd name="connsiteX33" fmla="*/ 3343117 w 4899993"/>
+              <a:gd name="connsiteY33" fmla="*/ 4097555 h 4899993"/>
+              <a:gd name="connsiteX34" fmla="*/ 3007180 w 4899993"/>
+              <a:gd name="connsiteY34" fmla="*/ 4239463 h 4899993"/>
+              <a:gd name="connsiteX35" fmla="*/ 2855513 w 4899993"/>
+              <a:gd name="connsiteY35" fmla="*/ 4278461 h 4899993"/>
+              <a:gd name="connsiteX36" fmla="*/ 2855513 w 4899993"/>
+              <a:gd name="connsiteY36" fmla="*/ 4717112 h 4899993"/>
+              <a:gd name="connsiteX37" fmla="*/ 2672632 w 4899993"/>
+              <a:gd name="connsiteY37" fmla="*/ 4899993 h 4899993"/>
+              <a:gd name="connsiteX38" fmla="*/ 2227360 w 4899993"/>
+              <a:gd name="connsiteY38" fmla="*/ 4899993 h 4899993"/>
+              <a:gd name="connsiteX39" fmla="*/ 2044480 w 4899993"/>
+              <a:gd name="connsiteY39" fmla="*/ 4717113 h 4899993"/>
+              <a:gd name="connsiteX40" fmla="*/ 2044480 w 4899993"/>
+              <a:gd name="connsiteY40" fmla="*/ 4278460 h 4899993"/>
+              <a:gd name="connsiteX41" fmla="*/ 1892816 w 4899993"/>
+              <a:gd name="connsiteY41" fmla="*/ 4239463 h 4899993"/>
+              <a:gd name="connsiteX42" fmla="*/ 1556880 w 4899993"/>
+              <a:gd name="connsiteY42" fmla="*/ 4097555 h 4899993"/>
+              <a:gd name="connsiteX43" fmla="*/ 1444312 w 4899993"/>
+              <a:gd name="connsiteY43" fmla="*/ 4029169 h 4899993"/>
+              <a:gd name="connsiteX44" fmla="*/ 1133648 w 4899993"/>
+              <a:gd name="connsiteY44" fmla="*/ 4339833 h 4899993"/>
+              <a:gd name="connsiteX45" fmla="*/ 875016 w 4899993"/>
+              <a:gd name="connsiteY45" fmla="*/ 4339832 h 4899993"/>
+              <a:gd name="connsiteX46" fmla="*/ 560161 w 4899993"/>
+              <a:gd name="connsiteY46" fmla="*/ 4024978 h 4899993"/>
+              <a:gd name="connsiteX47" fmla="*/ 560160 w 4899993"/>
+              <a:gd name="connsiteY47" fmla="*/ 3766346 h 4899993"/>
+              <a:gd name="connsiteX48" fmla="*/ 870825 w 4899993"/>
+              <a:gd name="connsiteY48" fmla="*/ 3455681 h 4899993"/>
+              <a:gd name="connsiteX49" fmla="*/ 802440 w 4899993"/>
+              <a:gd name="connsiteY49" fmla="*/ 3343116 h 4899993"/>
+              <a:gd name="connsiteX50" fmla="*/ 660532 w 4899993"/>
+              <a:gd name="connsiteY50" fmla="*/ 3007179 h 4899993"/>
+              <a:gd name="connsiteX51" fmla="*/ 621535 w 4899993"/>
+              <a:gd name="connsiteY51" fmla="*/ 2855513 h 4899993"/>
+              <a:gd name="connsiteX52" fmla="*/ 182880 w 4899993"/>
+              <a:gd name="connsiteY52" fmla="*/ 2855513 h 4899993"/>
+              <a:gd name="connsiteX53" fmla="*/ 0 w 4899993"/>
+              <a:gd name="connsiteY53" fmla="*/ 2672633 h 4899993"/>
+              <a:gd name="connsiteX54" fmla="*/ 0 w 4899993"/>
+              <a:gd name="connsiteY54" fmla="*/ 2227360 h 4899993"/>
+              <a:gd name="connsiteX55" fmla="*/ 182880 w 4899993"/>
+              <a:gd name="connsiteY55" fmla="*/ 2044480 h 4899993"/>
+              <a:gd name="connsiteX56" fmla="*/ 621535 w 4899993"/>
+              <a:gd name="connsiteY56" fmla="*/ 2044480 h 4899993"/>
+              <a:gd name="connsiteX57" fmla="*/ 660532 w 4899993"/>
+              <a:gd name="connsiteY57" fmla="*/ 1892815 h 4899993"/>
+              <a:gd name="connsiteX58" fmla="*/ 802440 w 4899993"/>
+              <a:gd name="connsiteY58" fmla="*/ 1556879 h 4899993"/>
+              <a:gd name="connsiteX59" fmla="*/ 870826 w 4899993"/>
+              <a:gd name="connsiteY59" fmla="*/ 1444313 h 4899993"/>
+              <a:gd name="connsiteX60" fmla="*/ 560160 w 4899993"/>
+              <a:gd name="connsiteY60" fmla="*/ 1133647 h 4899993"/>
+              <a:gd name="connsiteX61" fmla="*/ 560160 w 4899993"/>
+              <a:gd name="connsiteY61" fmla="*/ 875015 h 4899993"/>
+              <a:gd name="connsiteX62" fmla="*/ 875016 w 4899993"/>
+              <a:gd name="connsiteY62" fmla="*/ 560160 h 4899993"/>
+              <a:gd name="connsiteX63" fmla="*/ 1004331 w 4899993"/>
+              <a:gd name="connsiteY63" fmla="*/ 506596 h 4899993"/>
+              <a:gd name="connsiteX64" fmla="*/ 1133647 w 4899993"/>
+              <a:gd name="connsiteY64" fmla="*/ 560160 h 4899993"/>
+              <a:gd name="connsiteX65" fmla="*/ 1444313 w 4899993"/>
+              <a:gd name="connsiteY65" fmla="*/ 870825 h 4899993"/>
+              <a:gd name="connsiteX66" fmla="*/ 1556880 w 4899993"/>
+              <a:gd name="connsiteY66" fmla="*/ 802439 h 4899993"/>
+              <a:gd name="connsiteX67" fmla="*/ 1892816 w 4899993"/>
+              <a:gd name="connsiteY67" fmla="*/ 660531 h 4899993"/>
+              <a:gd name="connsiteX68" fmla="*/ 2044480 w 4899993"/>
+              <a:gd name="connsiteY68" fmla="*/ 621534 h 4899993"/>
+              <a:gd name="connsiteX69" fmla="*/ 2044480 w 4899993"/>
+              <a:gd name="connsiteY69" fmla="*/ 182881 h 4899993"/>
+              <a:gd name="connsiteX70" fmla="*/ 2227361 w 4899993"/>
+              <a:gd name="connsiteY70" fmla="*/ 0 h 4899993"/>
+            </a:gdLst>
+            <a:ahLst/>
+            <a:cxnLst>
+              <a:cxn ang="0">
+                <a:pos x="connsiteX0" y="connsiteY0"/>
+              </a:cxn>
+              <a:cxn ang="0">
+                <a:pos x="connsiteX1" y="connsiteY1"/>
+              </a:cxn>
+              <a:cxn ang="0">
+                <a:pos x="connsiteX2" y="connsiteY2"/>
+              </a:cxn>
+              <a:cxn ang="0">
+                <a:pos x="connsiteX3" y="connsiteY3"/>
+              </a:cxn>
+              <a:cxn ang="0">
+                <a:pos x="connsiteX4" y="connsiteY4"/>
+              </a:cxn>
+              <a:cxn ang="0">
+                <a:pos x="connsiteX5" y="connsiteY5"/>
+              </a:cxn>
+              <a:cxn ang="0">
+                <a:pos x="connsiteX6" y="connsiteY6"/>
+              </a:cxn>
+              <a:cxn ang="0">
+                <a:pos x="connsiteX7" y="connsiteY7"/>
+              </a:cxn>
+              <a:cxn ang="0">
+                <a:pos x="connsiteX8" y="connsiteY8"/>
+              </a:cxn>
+              <a:cxn ang="0">
+                <a:pos x="connsiteX9" y="connsiteY9"/>
+              </a:cxn>
+              <a:cxn ang="0">
+                <a:pos x="connsiteX10" y="connsiteY10"/>
+              </a:cxn>
+              <a:cxn ang="0">
+                <a:pos x="connsiteX11" y="connsiteY11"/>
+              </a:cxn>
+              <a:cxn ang="0">
+                <a:pos x="connsiteX12" y="connsiteY12"/>
+              </a:cxn>
+              <a:cxn ang="0">
+                <a:pos x="connsiteX13" y="connsiteY13"/>
+              </a:cxn>
+              <a:cxn ang="0">
+                <a:pos x="connsiteX14" y="connsiteY14"/>
+              </a:cxn>
+              <a:cxn ang="0">
+                <a:pos x="connsiteX15" y="connsiteY15"/>
+              </a:cxn>
+              <a:cxn ang="0">
+                <a:pos x="connsiteX16" y="connsiteY16"/>
+              </a:cxn>
+              <a:cxn ang="0">
+                <a:pos x="connsiteX17" y="connsiteY17"/>
+              </a:cxn>
+              <a:cxn ang="0">
+                <a:pos x="connsiteX18" y="connsiteY18"/>
+              </a:cxn>
+              <a:cxn ang="0">
+                <a:pos x="connsiteX19" y="connsiteY19"/>
+              </a:cxn>
+              <a:cxn ang="0">
+                <a:pos x="connsiteX20" y="connsiteY20"/>
+              </a:cxn>
+              <a:cxn ang="0">
+                <a:pos x="connsiteX21" y="connsiteY21"/>
+              </a:cxn>
+              <a:cxn ang="0">
+                <a:pos x="connsiteX22" y="connsiteY22"/>
+              </a:cxn>
+              <a:cxn ang="0">
+                <a:pos x="connsiteX23" y="connsiteY23"/>
+              </a:cxn>
+              <a:cxn ang="0">
+                <a:pos x="connsiteX24" y="connsiteY24"/>
+              </a:cxn>
+              <a:cxn ang="0">
+                <a:pos x="connsiteX25" y="connsiteY25"/>
+              </a:cxn>
+              <a:cxn ang="0">
+                <a:pos x="connsiteX26" y="connsiteY26"/>
+              </a:cxn>
+              <a:cxn ang="0">
+                <a:pos x="connsiteX27" y="connsiteY27"/>
+              </a:cxn>
+              <a:cxn ang="0">
+                <a:pos x="connsiteX28" y="connsiteY28"/>
+              </a:cxn>
+              <a:cxn ang="0">
+                <a:pos x="connsiteX29" y="connsiteY29"/>
+              </a:cxn>
+              <a:cxn ang="0">
+                <a:pos x="connsiteX30" y="connsiteY30"/>
+              </a:cxn>
+              <a:cxn ang="0">
+                <a:pos x="connsiteX31" y="connsiteY31"/>
+              </a:cxn>
+              <a:cxn ang="0">
+                <a:pos x="connsiteX32" y="connsiteY32"/>
+              </a:cxn>
+              <a:cxn ang="0">
+                <a:pos x="connsiteX33" y="connsiteY33"/>
+              </a:cxn>
+              <a:cxn ang="0">
+                <a:pos x="connsiteX34" y="connsiteY34"/>
+              </a:cxn>
+              <a:cxn ang="0">
+                <a:pos x="connsiteX35" y="connsiteY35"/>
+              </a:cxn>
+              <a:cxn ang="0">
+                <a:pos x="connsiteX36" y="connsiteY36"/>
+              </a:cxn>
+              <a:cxn ang="0">
+                <a:pos x="connsiteX37" y="connsiteY37"/>
+              </a:cxn>
+              <a:cxn ang="0">
+                <a:pos x="connsiteX38" y="connsiteY38"/>
+              </a:cxn>
+              <a:cxn ang="0">
+                <a:pos x="connsiteX39" y="connsiteY39"/>
+              </a:cxn>
+              <a:cxn ang="0">
+                <a:pos x="connsiteX40" y="connsiteY40"/>
+              </a:cxn>
+              <a:cxn ang="0">
+                <a:pos x="connsiteX41" y="connsiteY41"/>
+              </a:cxn>
+              <a:cxn ang="0">
+                <a:pos x="connsiteX42" y="connsiteY42"/>
+              </a:cxn>
+              <a:cxn ang="0">
+                <a:pos x="connsiteX43" y="connsiteY43"/>
+              </a:cxn>
+              <a:cxn ang="0">
+                <a:pos x="connsiteX44" y="connsiteY44"/>
+              </a:cxn>
+              <a:cxn ang="0">
+                <a:pos x="connsiteX45" y="connsiteY45"/>
+              </a:cxn>
+              <a:cxn ang="0">
+                <a:pos x="connsiteX46" y="connsiteY46"/>
+              </a:cxn>
+              <a:cxn ang="0">
+                <a:pos x="connsiteX47" y="connsiteY47"/>
+              </a:cxn>
+              <a:cxn ang="0">
+                <a:pos x="connsiteX48" y="connsiteY48"/>
+              </a:cxn>
+              <a:cxn ang="0">
+                <a:pos x="connsiteX49" y="connsiteY49"/>
+              </a:cxn>
+              <a:cxn ang="0">
+                <a:pos x="connsiteX50" y="connsiteY50"/>
+              </a:cxn>
+              <a:cxn ang="0">
+                <a:pos x="connsiteX51" y="connsiteY51"/>
+              </a:cxn>
+              <a:cxn ang="0">
+                <a:pos x="connsiteX52" y="connsiteY52"/>
+              </a:cxn>
+              <a:cxn ang="0">
+                <a:pos x="connsiteX53" y="connsiteY53"/>
+              </a:cxn>
+              <a:cxn ang="0">
+                <a:pos x="connsiteX54" y="connsiteY54"/>
+              </a:cxn>
+              <a:cxn ang="0">
+                <a:pos x="connsiteX55" y="connsiteY55"/>
+              </a:cxn>
+              <a:cxn ang="0">
+                <a:pos x="connsiteX56" y="connsiteY56"/>
+              </a:cxn>
+              <a:cxn ang="0">
+                <a:pos x="connsiteX57" y="connsiteY57"/>
+              </a:cxn>
+              <a:cxn ang="0">
+                <a:pos x="connsiteX58" y="connsiteY58"/>
+              </a:cxn>
+              <a:cxn ang="0">
+                <a:pos x="connsiteX59" y="connsiteY59"/>
+              </a:cxn>
+              <a:cxn ang="0">
+                <a:pos x="connsiteX60" y="connsiteY60"/>
+              </a:cxn>
+              <a:cxn ang="0">
+                <a:pos x="connsiteX61" y="connsiteY61"/>
+              </a:cxn>
+              <a:cxn ang="0">
+                <a:pos x="connsiteX62" y="connsiteY62"/>
+              </a:cxn>
+              <a:cxn ang="0">
+                <a:pos x="connsiteX63" y="connsiteY63"/>
+              </a:cxn>
+              <a:cxn ang="0">
+                <a:pos x="connsiteX64" y="connsiteY64"/>
+              </a:cxn>
+              <a:cxn ang="0">
+                <a:pos x="connsiteX65" y="connsiteY65"/>
+              </a:cxn>
+              <a:cxn ang="0">
+                <a:pos x="connsiteX66" y="connsiteY66"/>
+              </a:cxn>
+              <a:cxn ang="0">
+                <a:pos x="connsiteX67" y="connsiteY67"/>
+              </a:cxn>
+              <a:cxn ang="0">
+                <a:pos x="connsiteX68" y="connsiteY68"/>
+              </a:cxn>
+              <a:cxn ang="0">
+                <a:pos x="connsiteX69" y="connsiteY69"/>
+              </a:cxn>
+              <a:cxn ang="0">
+                <a:pos x="connsiteX70" y="connsiteY70"/>
+              </a:cxn>
+            </a:cxnLst>
+            <a:rect l="l" t="t" r="r" b="b"/>
+            <a:pathLst>
+              <a:path w="4899993" h="4899993">
+                <a:moveTo>
+                  <a:pt x="2449996" y="1523690"/>
+                </a:moveTo>
+                <a:cubicBezTo>
+                  <a:pt x="1938411" y="1523690"/>
+                  <a:pt x="1523690" y="1938411"/>
+                  <a:pt x="1523690" y="2449996"/>
+                </a:cubicBezTo>
+                <a:cubicBezTo>
+                  <a:pt x="1523690" y="2961581"/>
+                  <a:pt x="1938411" y="3376302"/>
+                  <a:pt x="2449996" y="3376302"/>
+                </a:cubicBezTo>
+                <a:cubicBezTo>
+                  <a:pt x="2961581" y="3376302"/>
+                  <a:pt x="3376302" y="2961581"/>
+                  <a:pt x="3376302" y="2449996"/>
+                </a:cubicBezTo>
+                <a:cubicBezTo>
+                  <a:pt x="3376302" y="1938411"/>
+                  <a:pt x="2961581" y="1523690"/>
+                  <a:pt x="2449996" y="1523690"/>
+                </a:cubicBezTo>
+                <a:close/>
+                <a:moveTo>
+                  <a:pt x="2227361" y="0"/>
+                </a:moveTo>
+                <a:lnTo>
+                  <a:pt x="2672633" y="0"/>
+                </a:lnTo>
+                <a:cubicBezTo>
+                  <a:pt x="2773635" y="0"/>
+                  <a:pt x="2855513" y="81878"/>
+                  <a:pt x="2855513" y="182880"/>
+                </a:cubicBezTo>
+                <a:lnTo>
+                  <a:pt x="2855513" y="621534"/>
+                </a:lnTo>
+                <a:lnTo>
+                  <a:pt x="3007180" y="660531"/>
+                </a:lnTo>
+                <a:cubicBezTo>
+                  <a:pt x="3124523" y="697028"/>
+                  <a:pt x="3236920" y="744750"/>
+                  <a:pt x="3343117" y="802439"/>
+                </a:cubicBezTo>
+                <a:lnTo>
+                  <a:pt x="3455682" y="870825"/>
+                </a:lnTo>
+                <a:lnTo>
+                  <a:pt x="3766347" y="560160"/>
+                </a:lnTo>
+                <a:cubicBezTo>
+                  <a:pt x="3837766" y="488741"/>
+                  <a:pt x="3953559" y="488741"/>
+                  <a:pt x="4024978" y="560161"/>
+                </a:cubicBezTo>
+                <a:lnTo>
+                  <a:pt x="4339834" y="875015"/>
+                </a:lnTo>
+                <a:cubicBezTo>
+                  <a:pt x="4411253" y="946435"/>
+                  <a:pt x="4411253" y="1062228"/>
+                  <a:pt x="4339834" y="1133647"/>
+                </a:cubicBezTo>
+                <a:lnTo>
+                  <a:pt x="4029170" y="1444311"/>
+                </a:lnTo>
+                <a:lnTo>
+                  <a:pt x="4097556" y="1556879"/>
+                </a:lnTo>
+                <a:cubicBezTo>
+                  <a:pt x="4155245" y="1663075"/>
+                  <a:pt x="4202967" y="1775473"/>
+                  <a:pt x="4239464" y="1892815"/>
+                </a:cubicBezTo>
+                <a:lnTo>
+                  <a:pt x="4278461" y="2044480"/>
+                </a:lnTo>
+                <a:lnTo>
+                  <a:pt x="4717113" y="2044480"/>
+                </a:lnTo>
+                <a:cubicBezTo>
+                  <a:pt x="4818115" y="2044480"/>
+                  <a:pt x="4899993" y="2126358"/>
+                  <a:pt x="4899993" y="2227360"/>
+                </a:cubicBezTo>
+                <a:lnTo>
+                  <a:pt x="4899993" y="2672633"/>
+                </a:lnTo>
+                <a:cubicBezTo>
+                  <a:pt x="4899993" y="2773635"/>
+                  <a:pt x="4818115" y="2855513"/>
+                  <a:pt x="4717113" y="2855513"/>
+                </a:cubicBezTo>
+                <a:lnTo>
+                  <a:pt x="4278461" y="2855513"/>
+                </a:lnTo>
+                <a:lnTo>
+                  <a:pt x="4239464" y="3007179"/>
+                </a:lnTo>
+                <a:cubicBezTo>
+                  <a:pt x="4202967" y="3124522"/>
+                  <a:pt x="4155245" y="3236919"/>
+                  <a:pt x="4097556" y="3343116"/>
+                </a:cubicBezTo>
+                <a:lnTo>
+                  <a:pt x="4029170" y="3455683"/>
+                </a:lnTo>
+                <a:lnTo>
+                  <a:pt x="4339833" y="3766346"/>
+                </a:lnTo>
+                <a:cubicBezTo>
+                  <a:pt x="4411252" y="3837765"/>
+                  <a:pt x="4411252" y="3953558"/>
+                  <a:pt x="4339833" y="4024978"/>
+                </a:cubicBezTo>
+                <a:lnTo>
+                  <a:pt x="4024978" y="4339833"/>
+                </a:lnTo>
+                <a:cubicBezTo>
+                  <a:pt x="3953558" y="4411252"/>
+                  <a:pt x="3837765" y="4411252"/>
+                  <a:pt x="3766346" y="4339833"/>
+                </a:cubicBezTo>
+                <a:lnTo>
+                  <a:pt x="3455683" y="4029170"/>
+                </a:lnTo>
+                <a:lnTo>
+                  <a:pt x="3343117" y="4097555"/>
+                </a:lnTo>
+                <a:cubicBezTo>
+                  <a:pt x="3236920" y="4155245"/>
+                  <a:pt x="3124523" y="4202966"/>
+                  <a:pt x="3007180" y="4239463"/>
+                </a:cubicBezTo>
+                <a:lnTo>
+                  <a:pt x="2855513" y="4278461"/>
+                </a:lnTo>
+                <a:lnTo>
+                  <a:pt x="2855513" y="4717112"/>
+                </a:lnTo>
+                <a:cubicBezTo>
+                  <a:pt x="2855512" y="4818115"/>
+                  <a:pt x="2773634" y="4899993"/>
+                  <a:pt x="2672632" y="4899993"/>
+                </a:cubicBezTo>
+                <a:lnTo>
+                  <a:pt x="2227360" y="4899993"/>
+                </a:lnTo>
+                <a:cubicBezTo>
+                  <a:pt x="2126358" y="4899993"/>
+                  <a:pt x="2044480" y="4818115"/>
+                  <a:pt x="2044480" y="4717113"/>
+                </a:cubicBezTo>
+                <a:lnTo>
+                  <a:pt x="2044480" y="4278460"/>
+                </a:lnTo>
+                <a:lnTo>
+                  <a:pt x="1892816" y="4239463"/>
+                </a:lnTo>
+                <a:cubicBezTo>
+                  <a:pt x="1775473" y="4202966"/>
+                  <a:pt x="1663076" y="4155245"/>
+                  <a:pt x="1556880" y="4097555"/>
+                </a:cubicBezTo>
+                <a:lnTo>
+                  <a:pt x="1444312" y="4029169"/>
+                </a:lnTo>
+                <a:lnTo>
+                  <a:pt x="1133648" y="4339833"/>
+                </a:lnTo>
+                <a:cubicBezTo>
+                  <a:pt x="1062228" y="4411253"/>
+                  <a:pt x="946435" y="4411253"/>
+                  <a:pt x="875016" y="4339832"/>
+                </a:cubicBezTo>
+                <a:lnTo>
+                  <a:pt x="560161" y="4024978"/>
+                </a:lnTo>
+                <a:cubicBezTo>
+                  <a:pt x="488740" y="3953558"/>
+                  <a:pt x="488740" y="3837765"/>
+                  <a:pt x="560160" y="3766346"/>
+                </a:cubicBezTo>
+                <a:lnTo>
+                  <a:pt x="870825" y="3455681"/>
+                </a:lnTo>
+                <a:lnTo>
+                  <a:pt x="802440" y="3343116"/>
+                </a:lnTo>
+                <a:cubicBezTo>
+                  <a:pt x="744751" y="3236919"/>
+                  <a:pt x="697030" y="3124522"/>
+                  <a:pt x="660532" y="3007179"/>
+                </a:cubicBezTo>
+                <a:lnTo>
+                  <a:pt x="621535" y="2855513"/>
+                </a:lnTo>
+                <a:lnTo>
+                  <a:pt x="182880" y="2855513"/>
+                </a:lnTo>
+                <a:cubicBezTo>
+                  <a:pt x="81878" y="2855513"/>
+                  <a:pt x="0" y="2773635"/>
+                  <a:pt x="0" y="2672633"/>
+                </a:cubicBezTo>
+                <a:lnTo>
+                  <a:pt x="0" y="2227360"/>
+                </a:lnTo>
+                <a:cubicBezTo>
+                  <a:pt x="0" y="2126358"/>
+                  <a:pt x="81878" y="2044480"/>
+                  <a:pt x="182880" y="2044480"/>
+                </a:cubicBezTo>
+                <a:lnTo>
+                  <a:pt x="621535" y="2044480"/>
+                </a:lnTo>
+                <a:lnTo>
+                  <a:pt x="660532" y="1892815"/>
+                </a:lnTo>
+                <a:cubicBezTo>
+                  <a:pt x="697030" y="1775473"/>
+                  <a:pt x="744751" y="1663075"/>
+                  <a:pt x="802440" y="1556879"/>
+                </a:cubicBezTo>
+                <a:lnTo>
+                  <a:pt x="870826" y="1444313"/>
+                </a:lnTo>
+                <a:lnTo>
+                  <a:pt x="560160" y="1133647"/>
+                </a:lnTo>
+                <a:cubicBezTo>
+                  <a:pt x="488741" y="1062228"/>
+                  <a:pt x="488741" y="946435"/>
+                  <a:pt x="560160" y="875015"/>
+                </a:cubicBezTo>
+                <a:lnTo>
+                  <a:pt x="875016" y="560160"/>
+                </a:lnTo>
+                <a:cubicBezTo>
+                  <a:pt x="910725" y="524450"/>
+                  <a:pt x="957529" y="506596"/>
+                  <a:pt x="1004331" y="506596"/>
+                </a:cubicBezTo>
+                <a:cubicBezTo>
+                  <a:pt x="1051134" y="506596"/>
+                  <a:pt x="1097938" y="524450"/>
+                  <a:pt x="1133647" y="560160"/>
+                </a:cubicBezTo>
+                <a:lnTo>
+                  <a:pt x="1444313" y="870825"/>
+                </a:lnTo>
+                <a:lnTo>
+                  <a:pt x="1556880" y="802439"/>
+                </a:lnTo>
+                <a:cubicBezTo>
+                  <a:pt x="1663076" y="744750"/>
+                  <a:pt x="1775473" y="697028"/>
+                  <a:pt x="1892816" y="660531"/>
+                </a:cubicBezTo>
+                <a:lnTo>
+                  <a:pt x="2044480" y="621534"/>
+                </a:lnTo>
+                <a:lnTo>
+                  <a:pt x="2044480" y="182881"/>
+                </a:lnTo>
+                <a:cubicBezTo>
+                  <a:pt x="2044481" y="81878"/>
+                  <a:pt x="2126359" y="0"/>
+                  <a:pt x="2227361" y="0"/>
+                </a:cubicBezTo>
+                <a:close/>
+              </a:path>
+            </a:pathLst>
+          </a:custGeom>
+        </p:spPr>
+        <p:style>
+          <a:lnRef idx="2">
+            <a:schemeClr val="accent1">
+              <a:shade val="50000"/>
+            </a:schemeClr>
+          </a:lnRef>
+          <a:fillRef idx="1">
+            <a:schemeClr val="accent1"/>
+          </a:fillRef>
+          <a:effectRef idx="0">
+            <a:schemeClr val="accent1"/>
+          </a:effectRef>
+          <a:fontRef idx="minor">
+            <a:schemeClr val="lt1"/>
+          </a:fontRef>
+        </p:style>
+        <p:txBody>
+          <a:bodyPr rtlCol="0" anchor="ctr"/>
+          <a:lstStyle/>
+          <a:p>
+            <a:pPr algn="ctr"/>
+            <a:endParaRPr lang="en-US"/>
+          </a:p>
+        </p:txBody>
+      </p:sp>
+    </p:spTree>
+    <p:extLst>
+      <p:ext uri="{BB962C8B-B14F-4D97-AF65-F5344CB8AC3E}">
+        <p14:creationId xmlns:p14="http://schemas.microsoft.com/office/powerpoint/2010/main" val="2873351848"/>
+      </p:ext>
+    </p:extLst>
+  </p:cSld>
+  <p:clrMapOvr>
+    <a:masterClrMapping/>
+  </p:clrMapOvr>
+</p:sld>
+</file>
+
 <file path=ppt/theme/theme1.xml><?xml version="1.0" encoding="utf-8"?>
 <a:theme xmlns:a="http://schemas.openxmlformats.org/drawingml/2006/main" name="Office Theme">
   <a:themeElements>

</xml_diff>

<commit_message>
End of episode 4
</commit_message>
<xml_diff>
--- a/Design Notes/Game 1 - Vector Artwork.pptx
+++ b/Design Notes/Game 1 - Vector Artwork.pptx
@@ -261,7 +261,7 @@
           <a:p>
             <a:fld id="{38C78A8B-55DF-4816-B4D6-D016811398EF}" type="datetimeFigureOut">
               <a:rPr lang="en-US" smtClean="0"/>
-              <a:t>8/1/2018</a:t>
+              <a:t>8/2/2018</a:t>
             </a:fld>
             <a:endParaRPr lang="en-US"/>
           </a:p>
@@ -459,7 +459,7 @@
           <a:p>
             <a:fld id="{38C78A8B-55DF-4816-B4D6-D016811398EF}" type="datetimeFigureOut">
               <a:rPr lang="en-US" smtClean="0"/>
-              <a:t>8/1/2018</a:t>
+              <a:t>8/2/2018</a:t>
             </a:fld>
             <a:endParaRPr lang="en-US"/>
           </a:p>
@@ -667,7 +667,7 @@
           <a:p>
             <a:fld id="{38C78A8B-55DF-4816-B4D6-D016811398EF}" type="datetimeFigureOut">
               <a:rPr lang="en-US" smtClean="0"/>
-              <a:t>8/1/2018</a:t>
+              <a:t>8/2/2018</a:t>
             </a:fld>
             <a:endParaRPr lang="en-US"/>
           </a:p>
@@ -865,7 +865,7 @@
           <a:p>
             <a:fld id="{38C78A8B-55DF-4816-B4D6-D016811398EF}" type="datetimeFigureOut">
               <a:rPr lang="en-US" smtClean="0"/>
-              <a:t>8/1/2018</a:t>
+              <a:t>8/2/2018</a:t>
             </a:fld>
             <a:endParaRPr lang="en-US"/>
           </a:p>
@@ -1140,7 +1140,7 @@
           <a:p>
             <a:fld id="{38C78A8B-55DF-4816-B4D6-D016811398EF}" type="datetimeFigureOut">
               <a:rPr lang="en-US" smtClean="0"/>
-              <a:t>8/1/2018</a:t>
+              <a:t>8/2/2018</a:t>
             </a:fld>
             <a:endParaRPr lang="en-US"/>
           </a:p>
@@ -1405,7 +1405,7 @@
           <a:p>
             <a:fld id="{38C78A8B-55DF-4816-B4D6-D016811398EF}" type="datetimeFigureOut">
               <a:rPr lang="en-US" smtClean="0"/>
-              <a:t>8/1/2018</a:t>
+              <a:t>8/2/2018</a:t>
             </a:fld>
             <a:endParaRPr lang="en-US"/>
           </a:p>
@@ -1817,7 +1817,7 @@
           <a:p>
             <a:fld id="{38C78A8B-55DF-4816-B4D6-D016811398EF}" type="datetimeFigureOut">
               <a:rPr lang="en-US" smtClean="0"/>
-              <a:t>8/1/2018</a:t>
+              <a:t>8/2/2018</a:t>
             </a:fld>
             <a:endParaRPr lang="en-US"/>
           </a:p>
@@ -1958,7 +1958,7 @@
           <a:p>
             <a:fld id="{38C78A8B-55DF-4816-B4D6-D016811398EF}" type="datetimeFigureOut">
               <a:rPr lang="en-US" smtClean="0"/>
-              <a:t>8/1/2018</a:t>
+              <a:t>8/2/2018</a:t>
             </a:fld>
             <a:endParaRPr lang="en-US"/>
           </a:p>
@@ -2071,7 +2071,7 @@
           <a:p>
             <a:fld id="{38C78A8B-55DF-4816-B4D6-D016811398EF}" type="datetimeFigureOut">
               <a:rPr lang="en-US" smtClean="0"/>
-              <a:t>8/1/2018</a:t>
+              <a:t>8/2/2018</a:t>
             </a:fld>
             <a:endParaRPr lang="en-US"/>
           </a:p>
@@ -2382,7 +2382,7 @@
           <a:p>
             <a:fld id="{38C78A8B-55DF-4816-B4D6-D016811398EF}" type="datetimeFigureOut">
               <a:rPr lang="en-US" smtClean="0"/>
-              <a:t>8/1/2018</a:t>
+              <a:t>8/2/2018</a:t>
             </a:fld>
             <a:endParaRPr lang="en-US"/>
           </a:p>
@@ -2670,7 +2670,7 @@
           <a:p>
             <a:fld id="{38C78A8B-55DF-4816-B4D6-D016811398EF}" type="datetimeFigureOut">
               <a:rPr lang="en-US" smtClean="0"/>
-              <a:t>8/1/2018</a:t>
+              <a:t>8/2/2018</a:t>
             </a:fld>
             <a:endParaRPr lang="en-US"/>
           </a:p>
@@ -2911,7 +2911,7 @@
           <a:p>
             <a:fld id="{38C78A8B-55DF-4816-B4D6-D016811398EF}" type="datetimeFigureOut">
               <a:rPr lang="en-US" smtClean="0"/>
-              <a:t>8/1/2018</a:t>
+              <a:t>8/2/2018</a:t>
             </a:fld>
             <a:endParaRPr lang="en-US"/>
           </a:p>
@@ -3456,10 +3456,7 @@
               <a:avLst/>
             </a:prstGeom>
             <a:solidFill>
-              <a:schemeClr val="accent2">
-                <a:lumMod val="60000"/>
-                <a:lumOff val="40000"/>
-              </a:schemeClr>
+              <a:srgbClr val="8E6DA7"/>
             </a:solidFill>
             <a:ln>
               <a:noFill/>
@@ -3511,10 +3508,7 @@
               <a:avLst/>
             </a:prstGeom>
             <a:solidFill>
-              <a:schemeClr val="accent2">
-                <a:lumMod val="40000"/>
-                <a:lumOff val="60000"/>
-              </a:schemeClr>
+              <a:srgbClr val="C0AECE"/>
             </a:solidFill>
             <a:ln>
               <a:noFill/>
@@ -3621,9 +3615,7 @@
               <a:avLst/>
             </a:prstGeom>
             <a:solidFill>
-              <a:schemeClr val="accent2">
-                <a:lumMod val="50000"/>
-              </a:schemeClr>
+              <a:srgbClr val="5F4573"/>
             </a:solidFill>
             <a:ln>
               <a:noFill/>
@@ -3657,10 +3649,10 @@
       </p:grpSp>
       <p:grpSp>
         <p:nvGrpSpPr>
-          <p:cNvPr id="16" name="Group 15">
-            <a:extLst>
-              <a:ext uri="{FF2B5EF4-FFF2-40B4-BE49-F238E27FC236}">
-                <a16:creationId xmlns:a16="http://schemas.microsoft.com/office/drawing/2014/main" id="{E80BAE26-D248-4316-BC89-F21E0F4C055E}"/>
+          <p:cNvPr id="15" name="Group 14">
+            <a:extLst>
+              <a:ext uri="{FF2B5EF4-FFF2-40B4-BE49-F238E27FC236}">
+                <a16:creationId xmlns:a16="http://schemas.microsoft.com/office/drawing/2014/main" id="{95413C7E-81E9-4E49-BC22-16B83AE42169}"/>
               </a:ext>
             </a:extLst>
           </p:cNvPr>
@@ -3669,10 +3661,152 @@
         </p:nvGrpSpPr>
         <p:grpSpPr>
           <a:xfrm>
-            <a:off x="6711500" y="3675088"/>
-            <a:ext cx="1239802" cy="2826684"/>
-            <a:chOff x="6711500" y="3675088"/>
-            <a:chExt cx="1239802" cy="2826684"/>
+            <a:off x="7093837" y="3655709"/>
+            <a:ext cx="592398" cy="1833394"/>
+            <a:chOff x="7164124" y="3675088"/>
+            <a:chExt cx="592398" cy="1833394"/>
+          </a:xfrm>
+        </p:grpSpPr>
+        <p:sp>
+          <p:nvSpPr>
+            <p:cNvPr id="8" name="Rectangle: Rounded Corners 7">
+              <a:extLst>
+                <a:ext uri="{FF2B5EF4-FFF2-40B4-BE49-F238E27FC236}">
+                  <a16:creationId xmlns:a16="http://schemas.microsoft.com/office/drawing/2014/main" id="{160D27C8-B9C6-4C84-B59E-D808AF9FCB49}"/>
+                </a:ext>
+              </a:extLst>
+            </p:cNvPr>
+            <p:cNvSpPr/>
+            <p:nvPr/>
+          </p:nvSpPr>
+          <p:spPr>
+            <a:xfrm rot="20208759">
+              <a:off x="7280427" y="3675088"/>
+              <a:ext cx="476095" cy="1833394"/>
+            </a:xfrm>
+            <a:prstGeom prst="roundRect">
+              <a:avLst>
+                <a:gd name="adj" fmla="val 50000"/>
+              </a:avLst>
+            </a:prstGeom>
+            <a:solidFill>
+              <a:schemeClr val="accent2">
+                <a:lumMod val="60000"/>
+                <a:lumOff val="40000"/>
+              </a:schemeClr>
+            </a:solidFill>
+            <a:ln>
+              <a:solidFill>
+                <a:schemeClr val="accent2">
+                  <a:lumMod val="50000"/>
+                </a:schemeClr>
+              </a:solidFill>
+            </a:ln>
+          </p:spPr>
+          <p:style>
+            <a:lnRef idx="2">
+              <a:schemeClr val="accent1">
+                <a:shade val="50000"/>
+              </a:schemeClr>
+            </a:lnRef>
+            <a:fillRef idx="1">
+              <a:schemeClr val="accent1"/>
+            </a:fillRef>
+            <a:effectRef idx="0">
+              <a:schemeClr val="accent1"/>
+            </a:effectRef>
+            <a:fontRef idx="minor">
+              <a:schemeClr val="lt1"/>
+            </a:fontRef>
+          </p:style>
+          <p:txBody>
+            <a:bodyPr rtlCol="0" anchor="ctr"/>
+            <a:lstStyle/>
+            <a:p>
+              <a:pPr algn="ctr"/>
+              <a:endParaRPr lang="en-US"/>
+            </a:p>
+          </p:txBody>
+        </p:sp>
+        <p:sp>
+          <p:nvSpPr>
+            <p:cNvPr id="11" name="Oval 10">
+              <a:extLst>
+                <a:ext uri="{FF2B5EF4-FFF2-40B4-BE49-F238E27FC236}">
+                  <a16:creationId xmlns:a16="http://schemas.microsoft.com/office/drawing/2014/main" id="{7F1862E1-0802-4F74-B2CB-6FCB0A4554E5}"/>
+                </a:ext>
+              </a:extLst>
+            </p:cNvPr>
+            <p:cNvSpPr/>
+            <p:nvPr/>
+          </p:nvSpPr>
+          <p:spPr>
+            <a:xfrm>
+              <a:off x="7164124" y="3881510"/>
+              <a:ext cx="174928" cy="174928"/>
+            </a:xfrm>
+            <a:prstGeom prst="ellipse">
+              <a:avLst/>
+            </a:prstGeom>
+            <a:solidFill>
+              <a:schemeClr val="tx1">
+                <a:lumMod val="50000"/>
+                <a:lumOff val="50000"/>
+              </a:schemeClr>
+            </a:solidFill>
+            <a:ln>
+              <a:solidFill>
+                <a:schemeClr val="tx1">
+                  <a:lumMod val="65000"/>
+                  <a:lumOff val="35000"/>
+                </a:schemeClr>
+              </a:solidFill>
+            </a:ln>
+          </p:spPr>
+          <p:style>
+            <a:lnRef idx="2">
+              <a:schemeClr val="accent1">
+                <a:shade val="50000"/>
+              </a:schemeClr>
+            </a:lnRef>
+            <a:fillRef idx="1">
+              <a:schemeClr val="accent1"/>
+            </a:fillRef>
+            <a:effectRef idx="0">
+              <a:schemeClr val="accent1"/>
+            </a:effectRef>
+            <a:fontRef idx="minor">
+              <a:schemeClr val="lt1"/>
+            </a:fontRef>
+          </p:style>
+          <p:txBody>
+            <a:bodyPr rtlCol="0" anchor="ctr"/>
+            <a:lstStyle/>
+            <a:p>
+              <a:pPr algn="ctr"/>
+              <a:endParaRPr lang="en-US"/>
+            </a:p>
+          </p:txBody>
+        </p:sp>
+      </p:grpSp>
+      <p:grpSp>
+        <p:nvGrpSpPr>
+          <p:cNvPr id="2" name="Group 1">
+            <a:extLst>
+              <a:ext uri="{FF2B5EF4-FFF2-40B4-BE49-F238E27FC236}">
+                <a16:creationId xmlns:a16="http://schemas.microsoft.com/office/drawing/2014/main" id="{7B6D8AB3-BA25-43A0-90A6-EAE99C6928FF}"/>
+              </a:ext>
+            </a:extLst>
+          </p:cNvPr>
+          <p:cNvGrpSpPr/>
+          <p:nvPr/>
+        </p:nvGrpSpPr>
+        <p:grpSpPr>
+          <a:xfrm>
+            <a:off x="7301259" y="5043223"/>
+            <a:ext cx="565827" cy="1556468"/>
+            <a:chOff x="7305963" y="4945304"/>
+            <a:chExt cx="565827" cy="1556468"/>
           </a:xfrm>
         </p:grpSpPr>
         <p:sp>
@@ -3735,6 +3869,87 @@
         </p:sp>
         <p:sp>
           <p:nvSpPr>
+            <p:cNvPr id="12" name="Oval 11">
+              <a:extLst>
+                <a:ext uri="{FF2B5EF4-FFF2-40B4-BE49-F238E27FC236}">
+                  <a16:creationId xmlns:a16="http://schemas.microsoft.com/office/drawing/2014/main" id="{14A3805B-287E-4D2F-976B-93368BE57838}"/>
+                </a:ext>
+              </a:extLst>
+            </p:cNvPr>
+            <p:cNvSpPr/>
+            <p:nvPr/>
+          </p:nvSpPr>
+          <p:spPr>
+            <a:xfrm>
+              <a:off x="7696862" y="5137595"/>
+              <a:ext cx="174928" cy="174928"/>
+            </a:xfrm>
+            <a:prstGeom prst="ellipse">
+              <a:avLst/>
+            </a:prstGeom>
+            <a:solidFill>
+              <a:schemeClr val="tx1">
+                <a:lumMod val="50000"/>
+                <a:lumOff val="50000"/>
+              </a:schemeClr>
+            </a:solidFill>
+            <a:ln>
+              <a:solidFill>
+                <a:schemeClr val="tx1">
+                  <a:lumMod val="65000"/>
+                  <a:lumOff val="35000"/>
+                </a:schemeClr>
+              </a:solidFill>
+            </a:ln>
+          </p:spPr>
+          <p:style>
+            <a:lnRef idx="2">
+              <a:schemeClr val="accent1">
+                <a:shade val="50000"/>
+              </a:schemeClr>
+            </a:lnRef>
+            <a:fillRef idx="1">
+              <a:schemeClr val="accent1"/>
+            </a:fillRef>
+            <a:effectRef idx="0">
+              <a:schemeClr val="accent1"/>
+            </a:effectRef>
+            <a:fontRef idx="minor">
+              <a:schemeClr val="lt1"/>
+            </a:fontRef>
+          </p:style>
+          <p:txBody>
+            <a:bodyPr rtlCol="0" anchor="ctr"/>
+            <a:lstStyle/>
+            <a:p>
+              <a:pPr algn="ctr"/>
+              <a:endParaRPr lang="en-US"/>
+            </a:p>
+          </p:txBody>
+        </p:sp>
+      </p:grpSp>
+      <p:grpSp>
+        <p:nvGrpSpPr>
+          <p:cNvPr id="19" name="Group 18">
+            <a:extLst>
+              <a:ext uri="{FF2B5EF4-FFF2-40B4-BE49-F238E27FC236}">
+                <a16:creationId xmlns:a16="http://schemas.microsoft.com/office/drawing/2014/main" id="{ACD57F53-430E-4BEE-803E-4C60BA09DCEE}"/>
+              </a:ext>
+            </a:extLst>
+          </p:cNvPr>
+          <p:cNvGrpSpPr/>
+          <p:nvPr/>
+        </p:nvGrpSpPr>
+        <p:grpSpPr>
+          <a:xfrm>
+            <a:off x="6713163" y="6230982"/>
+            <a:ext cx="1239802" cy="301513"/>
+            <a:chOff x="6711500" y="6171485"/>
+            <a:chExt cx="1239802" cy="301513"/>
+          </a:xfrm>
+        </p:grpSpPr>
+        <p:sp>
+          <p:nvSpPr>
             <p:cNvPr id="10" name="Rectangle: Rounded Corners 9">
               <a:extLst>
                 <a:ext uri="{FF2B5EF4-FFF2-40B4-BE49-F238E27FC236}">
@@ -3765,208 +3980,6 @@
               <a:solidFill>
                 <a:schemeClr val="accent2">
                   <a:lumMod val="50000"/>
-                </a:schemeClr>
-              </a:solidFill>
-            </a:ln>
-          </p:spPr>
-          <p:style>
-            <a:lnRef idx="2">
-              <a:schemeClr val="accent1">
-                <a:shade val="50000"/>
-              </a:schemeClr>
-            </a:lnRef>
-            <a:fillRef idx="1">
-              <a:schemeClr val="accent1"/>
-            </a:fillRef>
-            <a:effectRef idx="0">
-              <a:schemeClr val="accent1"/>
-            </a:effectRef>
-            <a:fontRef idx="minor">
-              <a:schemeClr val="lt1"/>
-            </a:fontRef>
-          </p:style>
-          <p:txBody>
-            <a:bodyPr rtlCol="0" anchor="ctr"/>
-            <a:lstStyle/>
-            <a:p>
-              <a:pPr algn="ctr"/>
-              <a:endParaRPr lang="en-US"/>
-            </a:p>
-          </p:txBody>
-        </p:sp>
-        <p:grpSp>
-          <p:nvGrpSpPr>
-            <p:cNvPr id="15" name="Group 14">
-              <a:extLst>
-                <a:ext uri="{FF2B5EF4-FFF2-40B4-BE49-F238E27FC236}">
-                  <a16:creationId xmlns:a16="http://schemas.microsoft.com/office/drawing/2014/main" id="{95413C7E-81E9-4E49-BC22-16B83AE42169}"/>
-                </a:ext>
-              </a:extLst>
-            </p:cNvPr>
-            <p:cNvGrpSpPr/>
-            <p:nvPr/>
-          </p:nvGrpSpPr>
-          <p:grpSpPr>
-            <a:xfrm>
-              <a:off x="7164124" y="3675088"/>
-              <a:ext cx="592398" cy="1833394"/>
-              <a:chOff x="7164124" y="3675088"/>
-              <a:chExt cx="592398" cy="1833394"/>
-            </a:xfrm>
-          </p:grpSpPr>
-          <p:sp>
-            <p:nvSpPr>
-              <p:cNvPr id="8" name="Rectangle: Rounded Corners 7">
-                <a:extLst>
-                  <a:ext uri="{FF2B5EF4-FFF2-40B4-BE49-F238E27FC236}">
-                    <a16:creationId xmlns:a16="http://schemas.microsoft.com/office/drawing/2014/main" id="{160D27C8-B9C6-4C84-B59E-D808AF9FCB49}"/>
-                  </a:ext>
-                </a:extLst>
-              </p:cNvPr>
-              <p:cNvSpPr/>
-              <p:nvPr/>
-            </p:nvSpPr>
-            <p:spPr>
-              <a:xfrm rot="20208759">
-                <a:off x="7280427" y="3675088"/>
-                <a:ext cx="476095" cy="1833394"/>
-              </a:xfrm>
-              <a:prstGeom prst="roundRect">
-                <a:avLst>
-                  <a:gd name="adj" fmla="val 50000"/>
-                </a:avLst>
-              </a:prstGeom>
-              <a:solidFill>
-                <a:schemeClr val="accent2">
-                  <a:lumMod val="60000"/>
-                  <a:lumOff val="40000"/>
-                </a:schemeClr>
-              </a:solidFill>
-              <a:ln>
-                <a:solidFill>
-                  <a:schemeClr val="accent2">
-                    <a:lumMod val="50000"/>
-                  </a:schemeClr>
-                </a:solidFill>
-              </a:ln>
-            </p:spPr>
-            <p:style>
-              <a:lnRef idx="2">
-                <a:schemeClr val="accent1">
-                  <a:shade val="50000"/>
-                </a:schemeClr>
-              </a:lnRef>
-              <a:fillRef idx="1">
-                <a:schemeClr val="accent1"/>
-              </a:fillRef>
-              <a:effectRef idx="0">
-                <a:schemeClr val="accent1"/>
-              </a:effectRef>
-              <a:fontRef idx="minor">
-                <a:schemeClr val="lt1"/>
-              </a:fontRef>
-            </p:style>
-            <p:txBody>
-              <a:bodyPr rtlCol="0" anchor="ctr"/>
-              <a:lstStyle/>
-              <a:p>
-                <a:pPr algn="ctr"/>
-                <a:endParaRPr lang="en-US"/>
-              </a:p>
-            </p:txBody>
-          </p:sp>
-          <p:sp>
-            <p:nvSpPr>
-              <p:cNvPr id="11" name="Oval 10">
-                <a:extLst>
-                  <a:ext uri="{FF2B5EF4-FFF2-40B4-BE49-F238E27FC236}">
-                    <a16:creationId xmlns:a16="http://schemas.microsoft.com/office/drawing/2014/main" id="{7F1862E1-0802-4F74-B2CB-6FCB0A4554E5}"/>
-                  </a:ext>
-                </a:extLst>
-              </p:cNvPr>
-              <p:cNvSpPr/>
-              <p:nvPr/>
-            </p:nvSpPr>
-            <p:spPr>
-              <a:xfrm>
-                <a:off x="7164124" y="3881510"/>
-                <a:ext cx="174928" cy="174928"/>
-              </a:xfrm>
-              <a:prstGeom prst="ellipse">
-                <a:avLst/>
-              </a:prstGeom>
-              <a:solidFill>
-                <a:schemeClr val="tx1">
-                  <a:lumMod val="50000"/>
-                  <a:lumOff val="50000"/>
-                </a:schemeClr>
-              </a:solidFill>
-              <a:ln>
-                <a:solidFill>
-                  <a:schemeClr val="tx1">
-                    <a:lumMod val="65000"/>
-                    <a:lumOff val="35000"/>
-                  </a:schemeClr>
-                </a:solidFill>
-              </a:ln>
-            </p:spPr>
-            <p:style>
-              <a:lnRef idx="2">
-                <a:schemeClr val="accent1">
-                  <a:shade val="50000"/>
-                </a:schemeClr>
-              </a:lnRef>
-              <a:fillRef idx="1">
-                <a:schemeClr val="accent1"/>
-              </a:fillRef>
-              <a:effectRef idx="0">
-                <a:schemeClr val="accent1"/>
-              </a:effectRef>
-              <a:fontRef idx="minor">
-                <a:schemeClr val="lt1"/>
-              </a:fontRef>
-            </p:style>
-            <p:txBody>
-              <a:bodyPr rtlCol="0" anchor="ctr"/>
-              <a:lstStyle/>
-              <a:p>
-                <a:pPr algn="ctr"/>
-                <a:endParaRPr lang="en-US"/>
-              </a:p>
-            </p:txBody>
-          </p:sp>
-        </p:grpSp>
-        <p:sp>
-          <p:nvSpPr>
-            <p:cNvPr id="12" name="Oval 11">
-              <a:extLst>
-                <a:ext uri="{FF2B5EF4-FFF2-40B4-BE49-F238E27FC236}">
-                  <a16:creationId xmlns:a16="http://schemas.microsoft.com/office/drawing/2014/main" id="{14A3805B-287E-4D2F-976B-93368BE57838}"/>
-                </a:ext>
-              </a:extLst>
-            </p:cNvPr>
-            <p:cNvSpPr/>
-            <p:nvPr/>
-          </p:nvSpPr>
-          <p:spPr>
-            <a:xfrm>
-              <a:off x="7696862" y="5137595"/>
-              <a:ext cx="174928" cy="174928"/>
-            </a:xfrm>
-            <a:prstGeom prst="ellipse">
-              <a:avLst/>
-            </a:prstGeom>
-            <a:solidFill>
-              <a:schemeClr val="tx1">
-                <a:lumMod val="50000"/>
-                <a:lumOff val="50000"/>
-              </a:schemeClr>
-            </a:solidFill>
-            <a:ln>
-              <a:solidFill>
-                <a:schemeClr val="tx1">
-                  <a:lumMod val="65000"/>
-                  <a:lumOff val="35000"/>
                 </a:schemeClr>
               </a:solidFill>
             </a:ln>
@@ -4029,6 +4042,328 @@
                   <a:lumOff val="35000"/>
                 </a:schemeClr>
               </a:solidFill>
+            </a:ln>
+          </p:spPr>
+          <p:style>
+            <a:lnRef idx="2">
+              <a:schemeClr val="accent1">
+                <a:shade val="50000"/>
+              </a:schemeClr>
+            </a:lnRef>
+            <a:fillRef idx="1">
+              <a:schemeClr val="accent1"/>
+            </a:fillRef>
+            <a:effectRef idx="0">
+              <a:schemeClr val="accent1"/>
+            </a:effectRef>
+            <a:fontRef idx="minor">
+              <a:schemeClr val="lt1"/>
+            </a:fontRef>
+          </p:style>
+          <p:txBody>
+            <a:bodyPr rtlCol="0" anchor="ctr"/>
+            <a:lstStyle/>
+            <a:p>
+              <a:pPr algn="ctr"/>
+              <a:endParaRPr lang="en-US"/>
+            </a:p>
+          </p:txBody>
+        </p:sp>
+      </p:grpSp>
+      <p:sp>
+        <p:nvSpPr>
+          <p:cNvPr id="21" name="Oval 20">
+            <a:extLst>
+              <a:ext uri="{FF2B5EF4-FFF2-40B4-BE49-F238E27FC236}">
+                <a16:creationId xmlns:a16="http://schemas.microsoft.com/office/drawing/2014/main" id="{DDD8DE9D-E7F2-4732-A8C5-6B5FC514814C}"/>
+              </a:ext>
+            </a:extLst>
+          </p:cNvPr>
+          <p:cNvSpPr/>
+          <p:nvPr/>
+        </p:nvSpPr>
+        <p:spPr>
+          <a:xfrm>
+            <a:off x="1375575" y="1368897"/>
+            <a:ext cx="2965838" cy="2965838"/>
+          </a:xfrm>
+          <a:prstGeom prst="ellipse">
+            <a:avLst/>
+          </a:prstGeom>
+          <a:solidFill>
+            <a:srgbClr val="8E6DA7"/>
+          </a:solidFill>
+          <a:ln>
+            <a:noFill/>
+          </a:ln>
+        </p:spPr>
+        <p:style>
+          <a:lnRef idx="2">
+            <a:schemeClr val="accent1">
+              <a:shade val="50000"/>
+            </a:schemeClr>
+          </a:lnRef>
+          <a:fillRef idx="1">
+            <a:schemeClr val="accent1"/>
+          </a:fillRef>
+          <a:effectRef idx="0">
+            <a:schemeClr val="accent1"/>
+          </a:effectRef>
+          <a:fontRef idx="minor">
+            <a:schemeClr val="lt1"/>
+          </a:fontRef>
+        </p:style>
+        <p:txBody>
+          <a:bodyPr rtlCol="0" anchor="ctr"/>
+          <a:lstStyle/>
+          <a:p>
+            <a:pPr algn="ctr"/>
+            <a:endParaRPr lang="en-US"/>
+          </a:p>
+        </p:txBody>
+      </p:sp>
+      <p:grpSp>
+        <p:nvGrpSpPr>
+          <p:cNvPr id="33" name="Group 32">
+            <a:extLst>
+              <a:ext uri="{FF2B5EF4-FFF2-40B4-BE49-F238E27FC236}">
+                <a16:creationId xmlns:a16="http://schemas.microsoft.com/office/drawing/2014/main" id="{16112FF1-6543-438A-8084-1F96C4BDEF2A}"/>
+              </a:ext>
+            </a:extLst>
+          </p:cNvPr>
+          <p:cNvGrpSpPr/>
+          <p:nvPr/>
+        </p:nvGrpSpPr>
+        <p:grpSpPr>
+          <a:xfrm>
+            <a:off x="1395457" y="1400703"/>
+            <a:ext cx="2945957" cy="2523781"/>
+            <a:chOff x="1401418" y="1400703"/>
+            <a:chExt cx="2945957" cy="2523781"/>
+          </a:xfrm>
+        </p:grpSpPr>
+        <p:sp>
+          <p:nvSpPr>
+            <p:cNvPr id="32" name="Freeform: Shape 31">
+              <a:extLst>
+                <a:ext uri="{FF2B5EF4-FFF2-40B4-BE49-F238E27FC236}">
+                  <a16:creationId xmlns:a16="http://schemas.microsoft.com/office/drawing/2014/main" id="{A86965C7-CBFD-4734-8291-234C60F59180}"/>
+                </a:ext>
+              </a:extLst>
+            </p:cNvPr>
+            <p:cNvSpPr/>
+            <p:nvPr/>
+          </p:nvSpPr>
+          <p:spPr>
+            <a:xfrm>
+              <a:off x="1401418" y="1400703"/>
+              <a:ext cx="2902226" cy="2523781"/>
+            </a:xfrm>
+            <a:custGeom>
+              <a:avLst/>
+              <a:gdLst>
+                <a:gd name="connsiteX0" fmla="*/ 1451113 w 2902226"/>
+                <a:gd name="connsiteY0" fmla="*/ 0 h 2523781"/>
+                <a:gd name="connsiteX1" fmla="*/ 2902226 w 2902226"/>
+                <a:gd name="connsiteY1" fmla="*/ 1451113 h 2523781"/>
+                <a:gd name="connsiteX2" fmla="*/ 2477205 w 2902226"/>
+                <a:gd name="connsiteY2" fmla="*/ 2477205 h 2523781"/>
+                <a:gd name="connsiteX3" fmla="*/ 2425959 w 2902226"/>
+                <a:gd name="connsiteY3" fmla="*/ 2523781 h 2523781"/>
+                <a:gd name="connsiteX4" fmla="*/ 1730729 w 2902226"/>
+                <a:gd name="connsiteY4" fmla="*/ 2523781 h 2523781"/>
+                <a:gd name="connsiteX5" fmla="*/ 1680657 w 2902226"/>
+                <a:gd name="connsiteY5" fmla="*/ 2482197 h 2523781"/>
+                <a:gd name="connsiteX6" fmla="*/ 1677761 w 2902226"/>
+                <a:gd name="connsiteY6" fmla="*/ 2458200 h 2523781"/>
+                <a:gd name="connsiteX7" fmla="*/ 1296062 w 2902226"/>
+                <a:gd name="connsiteY7" fmla="*/ 2198375 h 2523781"/>
+                <a:gd name="connsiteX8" fmla="*/ 914364 w 2902226"/>
+                <a:gd name="connsiteY8" fmla="*/ 2458200 h 2523781"/>
+                <a:gd name="connsiteX9" fmla="*/ 913955 w 2902226"/>
+                <a:gd name="connsiteY9" fmla="*/ 2461586 h 2523781"/>
+                <a:gd name="connsiteX10" fmla="*/ 833290 w 2902226"/>
+                <a:gd name="connsiteY10" fmla="*/ 2523781 h 2523781"/>
+                <a:gd name="connsiteX11" fmla="*/ 476268 w 2902226"/>
+                <a:gd name="connsiteY11" fmla="*/ 2523781 h 2523781"/>
+                <a:gd name="connsiteX12" fmla="*/ 425021 w 2902226"/>
+                <a:gd name="connsiteY12" fmla="*/ 2477205 h 2523781"/>
+                <a:gd name="connsiteX13" fmla="*/ 0 w 2902226"/>
+                <a:gd name="connsiteY13" fmla="*/ 1451113 h 2523781"/>
+                <a:gd name="connsiteX14" fmla="*/ 1451113 w 2902226"/>
+                <a:gd name="connsiteY14" fmla="*/ 0 h 2523781"/>
+              </a:gdLst>
+              <a:ahLst/>
+              <a:cxnLst>
+                <a:cxn ang="0">
+                  <a:pos x="connsiteX0" y="connsiteY0"/>
+                </a:cxn>
+                <a:cxn ang="0">
+                  <a:pos x="connsiteX1" y="connsiteY1"/>
+                </a:cxn>
+                <a:cxn ang="0">
+                  <a:pos x="connsiteX2" y="connsiteY2"/>
+                </a:cxn>
+                <a:cxn ang="0">
+                  <a:pos x="connsiteX3" y="connsiteY3"/>
+                </a:cxn>
+                <a:cxn ang="0">
+                  <a:pos x="connsiteX4" y="connsiteY4"/>
+                </a:cxn>
+                <a:cxn ang="0">
+                  <a:pos x="connsiteX5" y="connsiteY5"/>
+                </a:cxn>
+                <a:cxn ang="0">
+                  <a:pos x="connsiteX6" y="connsiteY6"/>
+                </a:cxn>
+                <a:cxn ang="0">
+                  <a:pos x="connsiteX7" y="connsiteY7"/>
+                </a:cxn>
+                <a:cxn ang="0">
+                  <a:pos x="connsiteX8" y="connsiteY8"/>
+                </a:cxn>
+                <a:cxn ang="0">
+                  <a:pos x="connsiteX9" y="connsiteY9"/>
+                </a:cxn>
+                <a:cxn ang="0">
+                  <a:pos x="connsiteX10" y="connsiteY10"/>
+                </a:cxn>
+                <a:cxn ang="0">
+                  <a:pos x="connsiteX11" y="connsiteY11"/>
+                </a:cxn>
+                <a:cxn ang="0">
+                  <a:pos x="connsiteX12" y="connsiteY12"/>
+                </a:cxn>
+                <a:cxn ang="0">
+                  <a:pos x="connsiteX13" y="connsiteY13"/>
+                </a:cxn>
+                <a:cxn ang="0">
+                  <a:pos x="connsiteX14" y="connsiteY14"/>
+                </a:cxn>
+              </a:cxnLst>
+              <a:rect l="l" t="t" r="r" b="b"/>
+              <a:pathLst>
+                <a:path w="2902226" h="2523781">
+                  <a:moveTo>
+                    <a:pt x="1451113" y="0"/>
+                  </a:moveTo>
+                  <a:cubicBezTo>
+                    <a:pt x="2252541" y="0"/>
+                    <a:pt x="2902226" y="649685"/>
+                    <a:pt x="2902226" y="1451113"/>
+                  </a:cubicBezTo>
+                  <a:cubicBezTo>
+                    <a:pt x="2902226" y="1851827"/>
+                    <a:pt x="2739805" y="2214605"/>
+                    <a:pt x="2477205" y="2477205"/>
+                  </a:cubicBezTo>
+                  <a:lnTo>
+                    <a:pt x="2425959" y="2523781"/>
+                  </a:lnTo>
+                  <a:lnTo>
+                    <a:pt x="1730729" y="2523781"/>
+                  </a:lnTo>
+                  <a:lnTo>
+                    <a:pt x="1680657" y="2482197"/>
+                  </a:lnTo>
+                  <a:lnTo>
+                    <a:pt x="1677761" y="2458200"/>
+                  </a:lnTo>
+                  <a:cubicBezTo>
+                    <a:pt x="1641431" y="2309918"/>
+                    <a:pt x="1484343" y="2198375"/>
+                    <a:pt x="1296062" y="2198375"/>
+                  </a:cubicBezTo>
+                  <a:cubicBezTo>
+                    <a:pt x="1107781" y="2198375"/>
+                    <a:pt x="950694" y="2309918"/>
+                    <a:pt x="914364" y="2458200"/>
+                  </a:cubicBezTo>
+                  <a:lnTo>
+                    <a:pt x="913955" y="2461586"/>
+                  </a:lnTo>
+                  <a:lnTo>
+                    <a:pt x="833290" y="2523781"/>
+                  </a:lnTo>
+                  <a:lnTo>
+                    <a:pt x="476268" y="2523781"/>
+                  </a:lnTo>
+                  <a:lnTo>
+                    <a:pt x="425021" y="2477205"/>
+                  </a:lnTo>
+                  <a:cubicBezTo>
+                    <a:pt x="162421" y="2214605"/>
+                    <a:pt x="0" y="1851827"/>
+                    <a:pt x="0" y="1451113"/>
+                  </a:cubicBezTo>
+                  <a:cubicBezTo>
+                    <a:pt x="0" y="649685"/>
+                    <a:pt x="649685" y="0"/>
+                    <a:pt x="1451113" y="0"/>
+                  </a:cubicBezTo>
+                  <a:close/>
+                </a:path>
+              </a:pathLst>
+            </a:custGeom>
+            <a:solidFill>
+              <a:srgbClr val="C0AECE"/>
+            </a:solidFill>
+            <a:ln>
+              <a:noFill/>
+            </a:ln>
+          </p:spPr>
+          <p:style>
+            <a:lnRef idx="2">
+              <a:schemeClr val="accent1">
+                <a:shade val="50000"/>
+              </a:schemeClr>
+            </a:lnRef>
+            <a:fillRef idx="1">
+              <a:schemeClr val="accent1"/>
+            </a:fillRef>
+            <a:effectRef idx="0">
+              <a:schemeClr val="accent1"/>
+            </a:effectRef>
+            <a:fontRef idx="minor">
+              <a:schemeClr val="lt1"/>
+            </a:fontRef>
+          </p:style>
+          <p:txBody>
+            <a:bodyPr wrap="square" rtlCol="0" anchor="ctr">
+              <a:noAutofit/>
+            </a:bodyPr>
+            <a:lstStyle/>
+            <a:p>
+              <a:pPr algn="ctr"/>
+              <a:endParaRPr lang="en-US" dirty="0"/>
+            </a:p>
+          </p:txBody>
+        </p:sp>
+        <p:sp>
+          <p:nvSpPr>
+            <p:cNvPr id="24" name="Oval 23">
+              <a:extLst>
+                <a:ext uri="{FF2B5EF4-FFF2-40B4-BE49-F238E27FC236}">
+                  <a16:creationId xmlns:a16="http://schemas.microsoft.com/office/drawing/2014/main" id="{1359D4A0-0121-454C-A63E-695ECF864670}"/>
+                </a:ext>
+              </a:extLst>
+            </p:cNvPr>
+            <p:cNvSpPr/>
+            <p:nvPr/>
+          </p:nvSpPr>
+          <p:spPr>
+            <a:xfrm>
+              <a:off x="3886200" y="2124271"/>
+              <a:ext cx="461175" cy="1455089"/>
+            </a:xfrm>
+            <a:prstGeom prst="ellipse">
+              <a:avLst/>
+            </a:prstGeom>
+            <a:solidFill>
+              <a:srgbClr val="5F4573"/>
+            </a:solidFill>
+            <a:ln>
+              <a:noFill/>
             </a:ln>
           </p:spPr>
           <p:style>
@@ -4813,7 +5148,7 @@
         </p:nvSpPr>
         <p:spPr>
           <a:xfrm rot="20627215">
-            <a:off x="5434694" y="827460"/>
+            <a:off x="4949665" y="1384051"/>
             <a:ext cx="3861797" cy="3861797"/>
           </a:xfrm>
           <a:custGeom>
@@ -5457,6 +5792,14 @@
               </a:path>
             </a:pathLst>
           </a:custGeom>
+          <a:solidFill>
+            <a:srgbClr val="593E6E"/>
+          </a:solidFill>
+          <a:ln w="76200">
+            <a:solidFill>
+              <a:schemeClr val="bg1"/>
+            </a:solidFill>
+          </a:ln>
         </p:spPr>
         <p:style>
           <a:lnRef idx="2">

</xml_diff>